<commit_message>
add study guide and shell scripting
</commit_message>
<xml_diff>
--- a/lectures/infrastructure-week-2.pptx
+++ b/lectures/infrastructure-week-2.pptx
@@ -12,14 +12,26 @@
     <p:sldId id="262" r:id="rId6"/>
     <p:sldId id="263" r:id="rId7"/>
     <p:sldId id="264" r:id="rId8"/>
-    <p:sldId id="266" r:id="rId9"/>
-    <p:sldId id="265" r:id="rId10"/>
-    <p:sldId id="267" r:id="rId11"/>
-    <p:sldId id="268" r:id="rId12"/>
-    <p:sldId id="271" r:id="rId13"/>
-    <p:sldId id="272" r:id="rId14"/>
-    <p:sldId id="273" r:id="rId15"/>
-    <p:sldId id="270" r:id="rId16"/>
+    <p:sldId id="274" r:id="rId9"/>
+    <p:sldId id="275" r:id="rId10"/>
+    <p:sldId id="276" r:id="rId11"/>
+    <p:sldId id="277" r:id="rId12"/>
+    <p:sldId id="278" r:id="rId13"/>
+    <p:sldId id="279" r:id="rId14"/>
+    <p:sldId id="280" r:id="rId15"/>
+    <p:sldId id="281" r:id="rId16"/>
+    <p:sldId id="283" r:id="rId17"/>
+    <p:sldId id="282" r:id="rId18"/>
+    <p:sldId id="284" r:id="rId19"/>
+    <p:sldId id="285" r:id="rId20"/>
+    <p:sldId id="266" r:id="rId21"/>
+    <p:sldId id="265" r:id="rId22"/>
+    <p:sldId id="267" r:id="rId23"/>
+    <p:sldId id="268" r:id="rId24"/>
+    <p:sldId id="271" r:id="rId25"/>
+    <p:sldId id="272" r:id="rId26"/>
+    <p:sldId id="273" r:id="rId27"/>
+    <p:sldId id="270" r:id="rId28"/>
   </p:sldIdLst>
   <p:sldSz cx="9144000" cy="6858000" type="screen4x3"/>
   <p:notesSz cx="6858000" cy="9144000"/>
@@ -118,6 +130,22 @@
       </a:defRPr>
     </a:lvl9pPr>
   </p:defaultTextStyle>
+  <p:extLst>
+    <p:ext uri="{EFAFB233-063F-42B5-8137-9DF3F51BA10A}">
+      <p15:sldGuideLst xmlns:p15="http://schemas.microsoft.com/office/powerpoint/2012/main">
+        <p15:guide id="1" orient="horz" pos="2160">
+          <p15:clr>
+            <a:srgbClr val="A4A3A4"/>
+          </p15:clr>
+        </p15:guide>
+        <p15:guide id="2" pos="2880">
+          <p15:clr>
+            <a:srgbClr val="A4A3A4"/>
+          </p15:clr>
+        </p15:guide>
+      </p15:sldGuideLst>
+    </p:ext>
+  </p:extLst>
 </p:presentation>
 </file>
 
@@ -302,7 +330,7 @@
           <a:p>
             <a:fld id="{5B60E164-4364-3441-BA83-2CF3942ACF8D}" type="datetimeFigureOut">
               <a:rPr lang="en-US" smtClean="0"/>
-              <a:t>8/13/16</a:t>
+              <a:t>9/3/16</a:t>
             </a:fld>
             <a:endParaRPr lang="en-US"/>
           </a:p>
@@ -472,7 +500,7 @@
           <a:p>
             <a:fld id="{5B60E164-4364-3441-BA83-2CF3942ACF8D}" type="datetimeFigureOut">
               <a:rPr lang="en-US" smtClean="0"/>
-              <a:t>8/13/16</a:t>
+              <a:t>9/3/16</a:t>
             </a:fld>
             <a:endParaRPr lang="en-US"/>
           </a:p>
@@ -652,7 +680,7 @@
           <a:p>
             <a:fld id="{5B60E164-4364-3441-BA83-2CF3942ACF8D}" type="datetimeFigureOut">
               <a:rPr lang="en-US" smtClean="0"/>
-              <a:t>8/13/16</a:t>
+              <a:t>9/3/16</a:t>
             </a:fld>
             <a:endParaRPr lang="en-US"/>
           </a:p>
@@ -822,7 +850,7 @@
           <a:p>
             <a:fld id="{5B60E164-4364-3441-BA83-2CF3942ACF8D}" type="datetimeFigureOut">
               <a:rPr lang="en-US" smtClean="0"/>
-              <a:t>8/13/16</a:t>
+              <a:t>9/3/16</a:t>
             </a:fld>
             <a:endParaRPr lang="en-US"/>
           </a:p>
@@ -1068,7 +1096,7 @@
           <a:p>
             <a:fld id="{5B60E164-4364-3441-BA83-2CF3942ACF8D}" type="datetimeFigureOut">
               <a:rPr lang="en-US" smtClean="0"/>
-              <a:t>8/13/16</a:t>
+              <a:t>9/3/16</a:t>
             </a:fld>
             <a:endParaRPr lang="en-US"/>
           </a:p>
@@ -1356,7 +1384,7 @@
           <a:p>
             <a:fld id="{5B60E164-4364-3441-BA83-2CF3942ACF8D}" type="datetimeFigureOut">
               <a:rPr lang="en-US" smtClean="0"/>
-              <a:t>8/13/16</a:t>
+              <a:t>9/3/16</a:t>
             </a:fld>
             <a:endParaRPr lang="en-US"/>
           </a:p>
@@ -1778,7 +1806,7 @@
           <a:p>
             <a:fld id="{5B60E164-4364-3441-BA83-2CF3942ACF8D}" type="datetimeFigureOut">
               <a:rPr lang="en-US" smtClean="0"/>
-              <a:t>8/13/16</a:t>
+              <a:t>9/3/16</a:t>
             </a:fld>
             <a:endParaRPr lang="en-US"/>
           </a:p>
@@ -1896,7 +1924,7 @@
           <a:p>
             <a:fld id="{5B60E164-4364-3441-BA83-2CF3942ACF8D}" type="datetimeFigureOut">
               <a:rPr lang="en-US" smtClean="0"/>
-              <a:t>8/13/16</a:t>
+              <a:t>9/3/16</a:t>
             </a:fld>
             <a:endParaRPr lang="en-US"/>
           </a:p>
@@ -1991,7 +2019,7 @@
           <a:p>
             <a:fld id="{5B60E164-4364-3441-BA83-2CF3942ACF8D}" type="datetimeFigureOut">
               <a:rPr lang="en-US" smtClean="0"/>
-              <a:t>8/13/16</a:t>
+              <a:t>9/3/16</a:t>
             </a:fld>
             <a:endParaRPr lang="en-US"/>
           </a:p>
@@ -2268,7 +2296,7 @@
           <a:p>
             <a:fld id="{5B60E164-4364-3441-BA83-2CF3942ACF8D}" type="datetimeFigureOut">
               <a:rPr lang="en-US" smtClean="0"/>
-              <a:t>8/13/16</a:t>
+              <a:t>9/3/16</a:t>
             </a:fld>
             <a:endParaRPr lang="en-US"/>
           </a:p>
@@ -2521,7 +2549,7 @@
           <a:p>
             <a:fld id="{5B60E164-4364-3441-BA83-2CF3942ACF8D}" type="datetimeFigureOut">
               <a:rPr lang="en-US" smtClean="0"/>
-              <a:t>8/13/16</a:t>
+              <a:t>9/3/16</a:t>
             </a:fld>
             <a:endParaRPr lang="en-US"/>
           </a:p>
@@ -2734,7 +2762,7 @@
           <a:p>
             <a:fld id="{5B60E164-4364-3441-BA83-2CF3942ACF8D}" type="datetimeFigureOut">
               <a:rPr lang="en-US" smtClean="0"/>
-              <a:t>8/13/16</a:t>
+              <a:t>9/3/16</a:t>
             </a:fld>
             <a:endParaRPr lang="en-US"/>
           </a:p>
@@ -3294,6 +3322,3180 @@
           <a:p>
             <a:r>
               <a:rPr lang="en-US" dirty="0" smtClean="0"/>
+              <a:t>Shell Scripting</a:t>
+            </a:r>
+            <a:endParaRPr lang="en-US" dirty="0"/>
+          </a:p>
+        </p:txBody>
+      </p:sp>
+      <p:sp>
+        <p:nvSpPr>
+          <p:cNvPr id="3" name="Content Placeholder 2"/>
+          <p:cNvSpPr>
+            <a:spLocks noGrp="1"/>
+          </p:cNvSpPr>
+          <p:nvPr>
+            <p:ph idx="1"/>
+          </p:nvPr>
+        </p:nvSpPr>
+        <p:spPr>
+          <a:xfrm>
+            <a:off x="457200" y="1600200"/>
+            <a:ext cx="8229600" cy="4905103"/>
+          </a:xfrm>
+        </p:spPr>
+        <p:txBody>
+          <a:bodyPr>
+            <a:normAutofit fontScale="62500" lnSpcReduction="20000"/>
+          </a:bodyPr>
+          <a:lstStyle/>
+          <a:p>
+            <a:r>
+              <a:rPr lang="en-US" dirty="0" smtClean="0"/>
+              <a:t>Example script:</a:t>
+            </a:r>
+          </a:p>
+          <a:p>
+            <a:endParaRPr lang="en-US" dirty="0" smtClean="0"/>
+          </a:p>
+          <a:p>
+            <a:pPr marL="457200" lvl="1" indent="0">
+              <a:buNone/>
+            </a:pPr>
+            <a:r>
+              <a:rPr lang="en-US" dirty="0" smtClean="0">
+                <a:latin typeface="Consolas" charset="0"/>
+                <a:ea typeface="Consolas" charset="0"/>
+                <a:cs typeface="Consolas" charset="0"/>
+              </a:rPr>
+              <a:t>#!/bin/bash</a:t>
+            </a:r>
+          </a:p>
+          <a:p>
+            <a:pPr marL="457200" lvl="1" indent="0">
+              <a:buNone/>
+            </a:pPr>
+            <a:r>
+              <a:rPr lang="en-US" dirty="0" smtClean="0">
+                <a:latin typeface="Consolas" charset="0"/>
+                <a:ea typeface="Consolas" charset="0"/>
+                <a:cs typeface="Consolas" charset="0"/>
+              </a:rPr>
+              <a:t>echo “Hello, world!”</a:t>
+            </a:r>
+          </a:p>
+          <a:p>
+            <a:pPr marL="457200" lvl="1" indent="0">
+              <a:buNone/>
+            </a:pPr>
+            <a:r>
+              <a:rPr lang="en-US" dirty="0">
+                <a:latin typeface="Consolas" charset="0"/>
+                <a:ea typeface="Consolas" charset="0"/>
+                <a:cs typeface="Consolas" charset="0"/>
+              </a:rPr>
+              <a:t>e</a:t>
+            </a:r>
+            <a:r>
+              <a:rPr lang="en-US" dirty="0" smtClean="0">
+                <a:latin typeface="Consolas" charset="0"/>
+                <a:ea typeface="Consolas" charset="0"/>
+                <a:cs typeface="Consolas" charset="0"/>
+              </a:rPr>
+              <a:t>cho “These are the current files, $PWD”</a:t>
+            </a:r>
+          </a:p>
+          <a:p>
+            <a:pPr marL="457200" lvl="1" indent="0">
+              <a:buNone/>
+            </a:pPr>
+            <a:r>
+              <a:rPr lang="en-US" dirty="0" smtClean="0">
+                <a:latin typeface="Consolas" charset="0"/>
+                <a:ea typeface="Consolas" charset="0"/>
+                <a:cs typeface="Consolas" charset="0"/>
+              </a:rPr>
+              <a:t>ls</a:t>
+            </a:r>
+          </a:p>
+          <a:p>
+            <a:pPr marL="457200" lvl="1" indent="0">
+              <a:buNone/>
+            </a:pPr>
+            <a:r>
+              <a:rPr lang="en-US" dirty="0">
+                <a:latin typeface="Consolas" charset="0"/>
+                <a:ea typeface="Consolas" charset="0"/>
+                <a:cs typeface="Consolas" charset="0"/>
+              </a:rPr>
+              <a:t>e</a:t>
+            </a:r>
+            <a:r>
+              <a:rPr lang="en-US" dirty="0" smtClean="0">
+                <a:latin typeface="Consolas" charset="0"/>
+                <a:ea typeface="Consolas" charset="0"/>
+                <a:cs typeface="Consolas" charset="0"/>
+              </a:rPr>
+              <a:t>xit 0</a:t>
+            </a:r>
+          </a:p>
+          <a:p>
+            <a:pPr marL="457200" lvl="1" indent="0">
+              <a:buNone/>
+            </a:pPr>
+            <a:endParaRPr lang="en-US" dirty="0" smtClean="0"/>
+          </a:p>
+          <a:p>
+            <a:r>
+              <a:rPr lang="en-US" dirty="0" smtClean="0"/>
+              <a:t>Let’s look at each line:</a:t>
+            </a:r>
+          </a:p>
+          <a:p>
+            <a:endParaRPr lang="en-US" dirty="0" smtClean="0"/>
+          </a:p>
+          <a:p>
+            <a:pPr lvl="1"/>
+            <a:r>
+              <a:rPr lang="en-US" dirty="0" smtClean="0"/>
+              <a:t>#!/bin/bash: aka ”</a:t>
+            </a:r>
+            <a:r>
+              <a:rPr lang="en-US" dirty="0" err="1" smtClean="0"/>
+              <a:t>sha</a:t>
+            </a:r>
+            <a:r>
+              <a:rPr lang="en-US" dirty="0" smtClean="0"/>
+              <a:t>-bang-bin-bash”, specifies the shell processor to execute the commands</a:t>
+            </a:r>
+          </a:p>
+          <a:p>
+            <a:pPr lvl="1"/>
+            <a:r>
+              <a:rPr lang="en-US" dirty="0" smtClean="0"/>
+              <a:t>echo: prints text to the display terminal (aka standard output)</a:t>
+            </a:r>
+          </a:p>
+          <a:p>
+            <a:pPr lvl="1"/>
+            <a:r>
+              <a:rPr lang="en-US" dirty="0" smtClean="0"/>
+              <a:t>ls: command to list files </a:t>
+            </a:r>
+          </a:p>
+          <a:p>
+            <a:pPr lvl="1"/>
+            <a:r>
+              <a:rPr lang="en-US" dirty="0" smtClean="0"/>
+              <a:t>$PWD: a variable that contains the present working directory </a:t>
+            </a:r>
+          </a:p>
+          <a:p>
+            <a:pPr lvl="1"/>
+            <a:r>
+              <a:rPr lang="en-US" dirty="0" smtClean="0"/>
+              <a:t>exit: terminate the script execution with a specified status code</a:t>
+            </a:r>
+          </a:p>
+        </p:txBody>
+      </p:sp>
+    </p:spTree>
+    <p:extLst>
+      <p:ext uri="{BB962C8B-B14F-4D97-AF65-F5344CB8AC3E}">
+        <p14:creationId xmlns:p14="http://schemas.microsoft.com/office/powerpoint/2010/main" val="480054386"/>
+      </p:ext>
+    </p:extLst>
+  </p:cSld>
+  <p:clrMapOvr>
+    <a:masterClrMapping/>
+  </p:clrMapOvr>
+</p:sld>
+</file>
+
+<file path=ppt/slides/slide11.xml><?xml version="1.0" encoding="utf-8"?>
+<p:sld xmlns:a="http://schemas.openxmlformats.org/drawingml/2006/main" xmlns:r="http://schemas.openxmlformats.org/officeDocument/2006/relationships" xmlns:p="http://schemas.openxmlformats.org/presentationml/2006/main">
+  <p:cSld>
+    <p:spTree>
+      <p:nvGrpSpPr>
+        <p:cNvPr id="1" name=""/>
+        <p:cNvGrpSpPr/>
+        <p:nvPr/>
+      </p:nvGrpSpPr>
+      <p:grpSpPr>
+        <a:xfrm>
+          <a:off x="0" y="0"/>
+          <a:ext cx="0" cy="0"/>
+          <a:chOff x="0" y="0"/>
+          <a:chExt cx="0" cy="0"/>
+        </a:xfrm>
+      </p:grpSpPr>
+      <p:sp>
+        <p:nvSpPr>
+          <p:cNvPr id="2" name="Title 1"/>
+          <p:cNvSpPr>
+            <a:spLocks noGrp="1"/>
+          </p:cNvSpPr>
+          <p:nvPr>
+            <p:ph type="title"/>
+          </p:nvPr>
+        </p:nvSpPr>
+        <p:spPr/>
+        <p:txBody>
+          <a:bodyPr/>
+          <a:lstStyle/>
+          <a:p>
+            <a:r>
+              <a:rPr lang="en-US" dirty="0" smtClean="0"/>
+              <a:t>Shell variables</a:t>
+            </a:r>
+            <a:endParaRPr lang="en-US" dirty="0"/>
+          </a:p>
+        </p:txBody>
+      </p:sp>
+      <p:sp>
+        <p:nvSpPr>
+          <p:cNvPr id="3" name="Content Placeholder 2"/>
+          <p:cNvSpPr>
+            <a:spLocks noGrp="1"/>
+          </p:cNvSpPr>
+          <p:nvPr>
+            <p:ph idx="1"/>
+          </p:nvPr>
+        </p:nvSpPr>
+        <p:spPr/>
+        <p:txBody>
+          <a:bodyPr>
+            <a:normAutofit fontScale="70000" lnSpcReduction="20000"/>
+          </a:bodyPr>
+          <a:lstStyle/>
+          <a:p>
+            <a:r>
+              <a:rPr lang="en-US" dirty="0" smtClean="0"/>
+              <a:t>Shell variables act like those found in typical programming languages.</a:t>
+            </a:r>
+          </a:p>
+          <a:p>
+            <a:pPr lvl="1"/>
+            <a:r>
+              <a:rPr lang="en-US" dirty="0" smtClean="0"/>
+              <a:t>Shells variables are not typed (i.e., no string, </a:t>
+            </a:r>
+            <a:r>
+              <a:rPr lang="en-US" dirty="0" err="1" smtClean="0"/>
+              <a:t>int</a:t>
+            </a:r>
+            <a:r>
+              <a:rPr lang="en-US" dirty="0" smtClean="0"/>
+              <a:t>, char, etc.)</a:t>
+            </a:r>
+          </a:p>
+          <a:p>
+            <a:pPr lvl="1"/>
+            <a:endParaRPr lang="en-US" dirty="0" smtClean="0"/>
+          </a:p>
+          <a:p>
+            <a:r>
+              <a:rPr lang="en-US" dirty="0" smtClean="0"/>
+              <a:t>Define a variable using: </a:t>
+            </a:r>
+            <a:r>
+              <a:rPr lang="en-US" dirty="0" smtClean="0">
+                <a:latin typeface="Consolas" charset="0"/>
+                <a:ea typeface="Consolas" charset="0"/>
+                <a:cs typeface="Consolas" charset="0"/>
+              </a:rPr>
+              <a:t>X=“value”</a:t>
+            </a:r>
+          </a:p>
+          <a:p>
+            <a:pPr lvl="1"/>
+            <a:r>
+              <a:rPr lang="en-US" dirty="0" smtClean="0"/>
+              <a:t>Note: Do not put spaces in assignment statement!</a:t>
+            </a:r>
+          </a:p>
+          <a:p>
+            <a:pPr lvl="1"/>
+            <a:r>
+              <a:rPr lang="en-US" dirty="0" smtClean="0"/>
+              <a:t>Common practice to capitalize variable names.</a:t>
+            </a:r>
+          </a:p>
+          <a:p>
+            <a:pPr lvl="1"/>
+            <a:endParaRPr lang="en-US" dirty="0" smtClean="0"/>
+          </a:p>
+          <a:p>
+            <a:r>
+              <a:rPr lang="en-US" dirty="0" smtClean="0"/>
+              <a:t>Refer to the variable in a script using: </a:t>
+            </a:r>
+            <a:r>
+              <a:rPr lang="en-US" dirty="0" smtClean="0">
+                <a:latin typeface="Consolas" charset="0"/>
+                <a:ea typeface="Consolas" charset="0"/>
+                <a:cs typeface="Consolas" charset="0"/>
+              </a:rPr>
+              <a:t>$X</a:t>
+            </a:r>
+          </a:p>
+          <a:p>
+            <a:endParaRPr lang="en-US" dirty="0" smtClean="0">
+              <a:latin typeface="Consolas" charset="0"/>
+              <a:ea typeface="Consolas" charset="0"/>
+              <a:cs typeface="Consolas" charset="0"/>
+            </a:endParaRPr>
+          </a:p>
+          <a:p>
+            <a:r>
+              <a:rPr lang="en-US" dirty="0" smtClean="0">
+                <a:ea typeface="Consolas" charset="0"/>
+                <a:cs typeface="Consolas" charset="0"/>
+              </a:rPr>
+              <a:t>Single quotes vs. double quotes</a:t>
+            </a:r>
+          </a:p>
+          <a:p>
+            <a:pPr lvl="1"/>
+            <a:r>
+              <a:rPr lang="en-US" dirty="0" smtClean="0">
+                <a:ea typeface="Consolas" charset="0"/>
+                <a:cs typeface="Consolas" charset="0"/>
+              </a:rPr>
+              <a:t>Variables are expanded within double quotes, but not single quotes</a:t>
+            </a:r>
+          </a:p>
+          <a:p>
+            <a:pPr lvl="1"/>
+            <a:r>
+              <a:rPr lang="en-US" dirty="0" smtClean="0">
+                <a:latin typeface="Consolas" charset="0"/>
+                <a:ea typeface="Consolas" charset="0"/>
+                <a:cs typeface="Consolas" charset="0"/>
+              </a:rPr>
+              <a:t>echo ‘$USER’ </a:t>
+            </a:r>
+            <a:r>
+              <a:rPr lang="en-US" dirty="0" smtClean="0">
+                <a:ea typeface="Consolas" charset="0"/>
+                <a:cs typeface="Consolas" charset="0"/>
+              </a:rPr>
+              <a:t>literally prints out the text: $USER</a:t>
+            </a:r>
+          </a:p>
+          <a:p>
+            <a:pPr lvl="1"/>
+            <a:r>
+              <a:rPr lang="en-US" dirty="0" smtClean="0">
+                <a:latin typeface="Consolas" charset="0"/>
+                <a:ea typeface="Consolas" charset="0"/>
+                <a:cs typeface="Consolas" charset="0"/>
+              </a:rPr>
+              <a:t>echo “$USER” </a:t>
+            </a:r>
+            <a:r>
+              <a:rPr lang="en-US" dirty="0" smtClean="0">
+                <a:ea typeface="Consolas" charset="0"/>
+                <a:cs typeface="Consolas" charset="0"/>
+              </a:rPr>
+              <a:t>prints out the value of the variable</a:t>
+            </a:r>
+          </a:p>
+        </p:txBody>
+      </p:sp>
+    </p:spTree>
+    <p:extLst>
+      <p:ext uri="{BB962C8B-B14F-4D97-AF65-F5344CB8AC3E}">
+        <p14:creationId xmlns:p14="http://schemas.microsoft.com/office/powerpoint/2010/main" val="354778684"/>
+      </p:ext>
+    </p:extLst>
+  </p:cSld>
+  <p:clrMapOvr>
+    <a:masterClrMapping/>
+  </p:clrMapOvr>
+</p:sld>
+</file>
+
+<file path=ppt/slides/slide12.xml><?xml version="1.0" encoding="utf-8"?>
+<p:sld xmlns:a="http://schemas.openxmlformats.org/drawingml/2006/main" xmlns:r="http://schemas.openxmlformats.org/officeDocument/2006/relationships" xmlns:p="http://schemas.openxmlformats.org/presentationml/2006/main">
+  <p:cSld>
+    <p:spTree>
+      <p:nvGrpSpPr>
+        <p:cNvPr id="1" name=""/>
+        <p:cNvGrpSpPr/>
+        <p:nvPr/>
+      </p:nvGrpSpPr>
+      <p:grpSpPr>
+        <a:xfrm>
+          <a:off x="0" y="0"/>
+          <a:ext cx="0" cy="0"/>
+          <a:chOff x="0" y="0"/>
+          <a:chExt cx="0" cy="0"/>
+        </a:xfrm>
+      </p:grpSpPr>
+      <p:sp>
+        <p:nvSpPr>
+          <p:cNvPr id="2" name="Title 1"/>
+          <p:cNvSpPr>
+            <a:spLocks noGrp="1"/>
+          </p:cNvSpPr>
+          <p:nvPr>
+            <p:ph type="title"/>
+          </p:nvPr>
+        </p:nvSpPr>
+        <p:spPr/>
+        <p:txBody>
+          <a:bodyPr/>
+          <a:lstStyle/>
+          <a:p>
+            <a:r>
+              <a:rPr lang="en-US" dirty="0" smtClean="0"/>
+              <a:t>Shell variables</a:t>
+            </a:r>
+            <a:endParaRPr lang="en-US" dirty="0"/>
+          </a:p>
+        </p:txBody>
+      </p:sp>
+      <p:sp>
+        <p:nvSpPr>
+          <p:cNvPr id="3" name="Content Placeholder 2"/>
+          <p:cNvSpPr>
+            <a:spLocks noGrp="1"/>
+          </p:cNvSpPr>
+          <p:nvPr>
+            <p:ph idx="1"/>
+          </p:nvPr>
+        </p:nvSpPr>
+        <p:spPr>
+          <a:xfrm>
+            <a:off x="457200" y="1600200"/>
+            <a:ext cx="8229600" cy="5009606"/>
+          </a:xfrm>
+        </p:spPr>
+        <p:txBody>
+          <a:bodyPr>
+            <a:normAutofit fontScale="62500" lnSpcReduction="20000"/>
+          </a:bodyPr>
+          <a:lstStyle/>
+          <a:p>
+            <a:r>
+              <a:rPr lang="en-US" dirty="0" smtClean="0"/>
+              <a:t>The shell replaces every occurrence of a variable with its value in the script.</a:t>
+            </a:r>
+          </a:p>
+          <a:p>
+            <a:endParaRPr lang="en-US" dirty="0" smtClean="0"/>
+          </a:p>
+          <a:p>
+            <a:pPr marL="400050" lvl="1" indent="0">
+              <a:buNone/>
+            </a:pPr>
+            <a:r>
+              <a:rPr lang="en-US" dirty="0" smtClean="0">
+                <a:latin typeface="Consolas" charset="0"/>
+                <a:ea typeface="Consolas" charset="0"/>
+                <a:cs typeface="Consolas" charset="0"/>
+              </a:rPr>
+              <a:t>#!/bin/bash</a:t>
+            </a:r>
+          </a:p>
+          <a:p>
+            <a:pPr marL="400050" lvl="1" indent="0">
+              <a:buNone/>
+            </a:pPr>
+            <a:r>
+              <a:rPr lang="en-US" dirty="0" smtClean="0">
+                <a:latin typeface="Consolas" charset="0"/>
+                <a:ea typeface="Consolas" charset="0"/>
+                <a:cs typeface="Consolas" charset="0"/>
+              </a:rPr>
+              <a:t>LS=“ls”</a:t>
+            </a:r>
+          </a:p>
+          <a:p>
+            <a:pPr marL="400050" lvl="1" indent="0">
+              <a:buNone/>
+            </a:pPr>
+            <a:r>
+              <a:rPr lang="en-US" dirty="0" smtClean="0">
+                <a:latin typeface="Consolas" charset="0"/>
+                <a:ea typeface="Consolas" charset="0"/>
+                <a:cs typeface="Consolas" charset="0"/>
+              </a:rPr>
+              <a:t>LS_FLAGS=“-al”</a:t>
+            </a:r>
+          </a:p>
+          <a:p>
+            <a:pPr marL="400050" lvl="1" indent="0">
+              <a:buNone/>
+            </a:pPr>
+            <a:r>
+              <a:rPr lang="en-US" dirty="0" smtClean="0">
+                <a:latin typeface="Consolas" charset="0"/>
+                <a:ea typeface="Consolas" charset="0"/>
+                <a:cs typeface="Consolas" charset="0"/>
+              </a:rPr>
+              <a:t>$LS $LS_FLAGS</a:t>
+            </a:r>
+          </a:p>
+          <a:p>
+            <a:pPr marL="400050" lvl="1" indent="0">
+              <a:buNone/>
+            </a:pPr>
+            <a:endParaRPr lang="en-US" dirty="0" smtClean="0">
+              <a:latin typeface="Consolas" charset="0"/>
+              <a:ea typeface="Consolas" charset="0"/>
+              <a:cs typeface="Consolas" charset="0"/>
+            </a:endParaRPr>
+          </a:p>
+          <a:p>
+            <a:r>
+              <a:rPr lang="en-US" dirty="0" smtClean="0"/>
+              <a:t>The shell replaces the last line with the value of the variables and executes it!</a:t>
+            </a:r>
+          </a:p>
+          <a:p>
+            <a:endParaRPr lang="en-US" dirty="0" smtClean="0"/>
+          </a:p>
+          <a:p>
+            <a:r>
+              <a:rPr lang="en-US" dirty="0" smtClean="0"/>
+              <a:t>What if you need to display a variable followed by other characters?</a:t>
+            </a:r>
+          </a:p>
+          <a:p>
+            <a:pPr marL="0" indent="0">
+              <a:buNone/>
+            </a:pPr>
+            <a:r>
+              <a:rPr lang="en-US" dirty="0" smtClean="0"/>
+              <a:t>	</a:t>
+            </a:r>
+            <a:r>
+              <a:rPr lang="en-US" dirty="0" smtClean="0">
+                <a:latin typeface="Consolas" charset="0"/>
+                <a:ea typeface="Consolas" charset="0"/>
+                <a:cs typeface="Consolas" charset="0"/>
+              </a:rPr>
+              <a:t>echo “$</a:t>
+            </a:r>
+            <a:r>
+              <a:rPr lang="en-US" dirty="0" err="1" smtClean="0">
+                <a:latin typeface="Consolas" charset="0"/>
+                <a:ea typeface="Consolas" charset="0"/>
+                <a:cs typeface="Consolas" charset="0"/>
+              </a:rPr>
+              <a:t>MYVARxyz</a:t>
+            </a:r>
+            <a:r>
+              <a:rPr lang="en-US" dirty="0" smtClean="0">
+                <a:latin typeface="Consolas" charset="0"/>
+                <a:ea typeface="Consolas" charset="0"/>
+                <a:cs typeface="Consolas" charset="0"/>
+              </a:rPr>
+              <a:t>”</a:t>
+            </a:r>
+          </a:p>
+          <a:p>
+            <a:pPr marL="0" indent="0">
+              <a:buNone/>
+            </a:pPr>
+            <a:endParaRPr lang="en-US" dirty="0" smtClean="0"/>
+          </a:p>
+          <a:p>
+            <a:r>
+              <a:rPr lang="en-US" dirty="0" smtClean="0"/>
+              <a:t>Protect the variable by surrounding it with braces.</a:t>
+            </a:r>
+          </a:p>
+          <a:p>
+            <a:pPr marL="0" indent="0">
+              <a:buNone/>
+            </a:pPr>
+            <a:r>
+              <a:rPr lang="en-US" dirty="0" smtClean="0"/>
+              <a:t>	</a:t>
+            </a:r>
+            <a:r>
+              <a:rPr lang="en-US" dirty="0" smtClean="0">
+                <a:latin typeface="Consolas" charset="0"/>
+                <a:ea typeface="Consolas" charset="0"/>
+                <a:cs typeface="Consolas" charset="0"/>
+              </a:rPr>
+              <a:t>echo “${MYVAR}xyz”</a:t>
+            </a:r>
+            <a:endParaRPr lang="en-US" dirty="0" smtClean="0">
+              <a:ea typeface="Consolas" charset="0"/>
+              <a:cs typeface="Consolas" charset="0"/>
+            </a:endParaRPr>
+          </a:p>
+          <a:p>
+            <a:endParaRPr lang="en-US" dirty="0" smtClean="0"/>
+          </a:p>
+        </p:txBody>
+      </p:sp>
+    </p:spTree>
+    <p:extLst>
+      <p:ext uri="{BB962C8B-B14F-4D97-AF65-F5344CB8AC3E}">
+        <p14:creationId xmlns:p14="http://schemas.microsoft.com/office/powerpoint/2010/main" val="348717902"/>
+      </p:ext>
+    </p:extLst>
+  </p:cSld>
+  <p:clrMapOvr>
+    <a:masterClrMapping/>
+  </p:clrMapOvr>
+</p:sld>
+</file>
+
+<file path=ppt/slides/slide13.xml><?xml version="1.0" encoding="utf-8"?>
+<p:sld xmlns:a="http://schemas.openxmlformats.org/drawingml/2006/main" xmlns:r="http://schemas.openxmlformats.org/officeDocument/2006/relationships" xmlns:p="http://schemas.openxmlformats.org/presentationml/2006/main">
+  <p:cSld>
+    <p:spTree>
+      <p:nvGrpSpPr>
+        <p:cNvPr id="1" name=""/>
+        <p:cNvGrpSpPr/>
+        <p:nvPr/>
+      </p:nvGrpSpPr>
+      <p:grpSpPr>
+        <a:xfrm>
+          <a:off x="0" y="0"/>
+          <a:ext cx="0" cy="0"/>
+          <a:chOff x="0" y="0"/>
+          <a:chExt cx="0" cy="0"/>
+        </a:xfrm>
+      </p:grpSpPr>
+      <p:sp>
+        <p:nvSpPr>
+          <p:cNvPr id="2" name="Title 1"/>
+          <p:cNvSpPr>
+            <a:spLocks noGrp="1"/>
+          </p:cNvSpPr>
+          <p:nvPr>
+            <p:ph type="title"/>
+          </p:nvPr>
+        </p:nvSpPr>
+        <p:spPr/>
+        <p:txBody>
+          <a:bodyPr/>
+          <a:lstStyle/>
+          <a:p>
+            <a:r>
+              <a:rPr lang="en-US" dirty="0" smtClean="0"/>
+              <a:t>Shell variables</a:t>
+            </a:r>
+            <a:endParaRPr lang="en-US" dirty="0"/>
+          </a:p>
+        </p:txBody>
+      </p:sp>
+      <p:sp>
+        <p:nvSpPr>
+          <p:cNvPr id="3" name="Content Placeholder 2"/>
+          <p:cNvSpPr>
+            <a:spLocks noGrp="1"/>
+          </p:cNvSpPr>
+          <p:nvPr>
+            <p:ph idx="1"/>
+          </p:nvPr>
+        </p:nvSpPr>
+        <p:spPr>
+          <a:xfrm>
+            <a:off x="457200" y="1600200"/>
+            <a:ext cx="8229600" cy="4983480"/>
+          </a:xfrm>
+        </p:spPr>
+        <p:txBody>
+          <a:bodyPr>
+            <a:normAutofit fontScale="70000" lnSpcReduction="20000"/>
+          </a:bodyPr>
+          <a:lstStyle/>
+          <a:p>
+            <a:r>
+              <a:rPr lang="en-US" dirty="0" smtClean="0"/>
+              <a:t>Executing a shell script from command-line:</a:t>
+            </a:r>
+          </a:p>
+          <a:p>
+            <a:pPr lvl="1"/>
+            <a:r>
+              <a:rPr lang="en-US" dirty="0" err="1"/>
+              <a:t>s</a:t>
+            </a:r>
+            <a:r>
+              <a:rPr lang="en-US" dirty="0" err="1" smtClean="0"/>
+              <a:t>criptname</a:t>
+            </a:r>
+            <a:r>
+              <a:rPr lang="en-US" dirty="0" smtClean="0"/>
+              <a:t> arg1 arg2 arg3</a:t>
+            </a:r>
+            <a:endParaRPr lang="is-IS" dirty="0" smtClean="0"/>
+          </a:p>
+          <a:p>
+            <a:r>
+              <a:rPr lang="is-IS" dirty="0" smtClean="0"/>
+              <a:t>Shell has some built-in variables associated with this command execution:</a:t>
+            </a:r>
+          </a:p>
+          <a:p>
+            <a:pPr lvl="1"/>
+            <a:r>
+              <a:rPr lang="is-IS" dirty="0" smtClean="0"/>
+              <a:t>$0: scriptname</a:t>
+            </a:r>
+          </a:p>
+          <a:p>
+            <a:pPr lvl="1"/>
+            <a:r>
+              <a:rPr lang="is-IS" dirty="0" smtClean="0"/>
+              <a:t>$1: arg1</a:t>
+            </a:r>
+          </a:p>
+          <a:p>
+            <a:pPr lvl="1"/>
+            <a:r>
+              <a:rPr lang="is-IS" dirty="0" smtClean="0"/>
+              <a:t>$2: arg2</a:t>
+            </a:r>
+          </a:p>
+          <a:p>
+            <a:pPr lvl="1"/>
+            <a:r>
+              <a:rPr lang="is-IS" dirty="0" smtClean="0"/>
+              <a:t>$3: arg3</a:t>
+            </a:r>
+          </a:p>
+          <a:p>
+            <a:pPr lvl="1"/>
+            <a:r>
+              <a:rPr lang="is-IS" dirty="0" smtClean="0"/>
+              <a:t>$#: number of command-line arguments (3)</a:t>
+            </a:r>
+          </a:p>
+          <a:p>
+            <a:pPr lvl="1"/>
+            <a:endParaRPr lang="is-IS" dirty="0" smtClean="0"/>
+          </a:p>
+          <a:p>
+            <a:r>
+              <a:rPr lang="is-IS" dirty="0" smtClean="0"/>
+              <a:t>Other common built-in variables</a:t>
+            </a:r>
+          </a:p>
+          <a:p>
+            <a:pPr lvl="1"/>
+            <a:r>
+              <a:rPr lang="is-IS" dirty="0" smtClean="0"/>
+              <a:t>$HOME: home directory of current user</a:t>
+            </a:r>
+          </a:p>
+          <a:p>
+            <a:pPr lvl="1"/>
+            <a:r>
+              <a:rPr lang="is-IS" dirty="0" smtClean="0"/>
+              <a:t>$HOSTNAME: name assigned to the system</a:t>
+            </a:r>
+          </a:p>
+          <a:p>
+            <a:pPr lvl="1"/>
+            <a:r>
+              <a:rPr lang="is-IS" dirty="0" smtClean="0"/>
+              <a:t>$PATH: file directories where executable applications are located</a:t>
+            </a:r>
+          </a:p>
+          <a:p>
+            <a:pPr lvl="1"/>
+            <a:r>
+              <a:rPr lang="is-IS" dirty="0" smtClean="0"/>
+              <a:t>$PWD: current working directory</a:t>
+            </a:r>
+          </a:p>
+          <a:p>
+            <a:pPr lvl="1"/>
+            <a:r>
+              <a:rPr lang="is-IS" dirty="0" smtClean="0"/>
+              <a:t>$UID: current user ID number</a:t>
+            </a:r>
+          </a:p>
+          <a:p>
+            <a:endParaRPr lang="en-US" dirty="0"/>
+          </a:p>
+        </p:txBody>
+      </p:sp>
+    </p:spTree>
+    <p:extLst>
+      <p:ext uri="{BB962C8B-B14F-4D97-AF65-F5344CB8AC3E}">
+        <p14:creationId xmlns:p14="http://schemas.microsoft.com/office/powerpoint/2010/main" val="354788383"/>
+      </p:ext>
+    </p:extLst>
+  </p:cSld>
+  <p:clrMapOvr>
+    <a:masterClrMapping/>
+  </p:clrMapOvr>
+</p:sld>
+</file>
+
+<file path=ppt/slides/slide14.xml><?xml version="1.0" encoding="utf-8"?>
+<p:sld xmlns:a="http://schemas.openxmlformats.org/drawingml/2006/main" xmlns:r="http://schemas.openxmlformats.org/officeDocument/2006/relationships" xmlns:p="http://schemas.openxmlformats.org/presentationml/2006/main">
+  <p:cSld>
+    <p:spTree>
+      <p:nvGrpSpPr>
+        <p:cNvPr id="1" name=""/>
+        <p:cNvGrpSpPr/>
+        <p:nvPr/>
+      </p:nvGrpSpPr>
+      <p:grpSpPr>
+        <a:xfrm>
+          <a:off x="0" y="0"/>
+          <a:ext cx="0" cy="0"/>
+          <a:chOff x="0" y="0"/>
+          <a:chExt cx="0" cy="0"/>
+        </a:xfrm>
+      </p:grpSpPr>
+      <p:sp>
+        <p:nvSpPr>
+          <p:cNvPr id="2" name="Title 1"/>
+          <p:cNvSpPr>
+            <a:spLocks noGrp="1"/>
+          </p:cNvSpPr>
+          <p:nvPr>
+            <p:ph type="title"/>
+          </p:nvPr>
+        </p:nvSpPr>
+        <p:spPr/>
+        <p:txBody>
+          <a:bodyPr>
+            <a:normAutofit/>
+          </a:bodyPr>
+          <a:lstStyle/>
+          <a:p>
+            <a:r>
+              <a:rPr lang="en-US" dirty="0" smtClean="0"/>
+              <a:t>Shell conditionals</a:t>
+            </a:r>
+            <a:endParaRPr lang="en-US" dirty="0"/>
+          </a:p>
+        </p:txBody>
+      </p:sp>
+      <p:sp>
+        <p:nvSpPr>
+          <p:cNvPr id="3" name="Content Placeholder 2"/>
+          <p:cNvSpPr>
+            <a:spLocks noGrp="1"/>
+          </p:cNvSpPr>
+          <p:nvPr>
+            <p:ph idx="1"/>
+          </p:nvPr>
+        </p:nvSpPr>
+        <p:spPr>
+          <a:xfrm>
+            <a:off x="457200" y="1293223"/>
+            <a:ext cx="8229600" cy="5564777"/>
+          </a:xfrm>
+        </p:spPr>
+        <p:txBody>
+          <a:bodyPr>
+            <a:normAutofit fontScale="55000" lnSpcReduction="20000"/>
+          </a:bodyPr>
+          <a:lstStyle/>
+          <a:p>
+            <a:r>
+              <a:rPr lang="en-US" dirty="0" smtClean="0"/>
+              <a:t>Shell supports conditional checks to branch execution:</a:t>
+            </a:r>
+          </a:p>
+          <a:p>
+            <a:endParaRPr lang="en-US" dirty="0" smtClean="0"/>
+          </a:p>
+          <a:p>
+            <a:pPr marL="0" indent="0">
+              <a:buNone/>
+            </a:pPr>
+            <a:r>
+              <a:rPr lang="en-US" dirty="0">
+                <a:latin typeface="Consolas" charset="0"/>
+                <a:ea typeface="Consolas" charset="0"/>
+                <a:cs typeface="Consolas" charset="0"/>
+              </a:rPr>
+              <a:t>	</a:t>
+            </a:r>
+            <a:r>
+              <a:rPr lang="en-US" dirty="0" smtClean="0">
+                <a:latin typeface="Consolas" charset="0"/>
+                <a:ea typeface="Consolas" charset="0"/>
+                <a:cs typeface="Consolas" charset="0"/>
+              </a:rPr>
+              <a:t>if </a:t>
+            </a:r>
+            <a:r>
+              <a:rPr lang="en-US" i="1" dirty="0" smtClean="0">
+                <a:latin typeface="Consolas" charset="0"/>
+                <a:ea typeface="Consolas" charset="0"/>
+                <a:cs typeface="Consolas" charset="0"/>
+              </a:rPr>
+              <a:t>condition1</a:t>
+            </a:r>
+          </a:p>
+          <a:p>
+            <a:pPr marL="0" indent="0">
+              <a:buNone/>
+            </a:pPr>
+            <a:r>
+              <a:rPr lang="en-US" dirty="0">
+                <a:latin typeface="Consolas" charset="0"/>
+                <a:ea typeface="Consolas" charset="0"/>
+                <a:cs typeface="Consolas" charset="0"/>
+              </a:rPr>
+              <a:t>	</a:t>
+            </a:r>
+            <a:r>
+              <a:rPr lang="en-US" dirty="0" smtClean="0">
+                <a:latin typeface="Consolas" charset="0"/>
+                <a:ea typeface="Consolas" charset="0"/>
+                <a:cs typeface="Consolas" charset="0"/>
+              </a:rPr>
+              <a:t>then</a:t>
+            </a:r>
+          </a:p>
+          <a:p>
+            <a:pPr marL="0" indent="0">
+              <a:buNone/>
+            </a:pPr>
+            <a:r>
+              <a:rPr lang="en-US" dirty="0">
+                <a:latin typeface="Consolas" charset="0"/>
+                <a:ea typeface="Consolas" charset="0"/>
+                <a:cs typeface="Consolas" charset="0"/>
+              </a:rPr>
+              <a:t>	</a:t>
+            </a:r>
+            <a:r>
+              <a:rPr lang="en-US" dirty="0" smtClean="0">
+                <a:latin typeface="Consolas" charset="0"/>
+                <a:ea typeface="Consolas" charset="0"/>
+                <a:cs typeface="Consolas" charset="0"/>
+              </a:rPr>
+              <a:t>	statement1</a:t>
+            </a:r>
+          </a:p>
+          <a:p>
+            <a:pPr marL="0" indent="0">
+              <a:buNone/>
+            </a:pPr>
+            <a:r>
+              <a:rPr lang="en-US" dirty="0">
+                <a:latin typeface="Consolas" charset="0"/>
+                <a:ea typeface="Consolas" charset="0"/>
+                <a:cs typeface="Consolas" charset="0"/>
+              </a:rPr>
+              <a:t>	</a:t>
+            </a:r>
+            <a:r>
+              <a:rPr lang="en-US" dirty="0" smtClean="0">
+                <a:latin typeface="Consolas" charset="0"/>
+                <a:ea typeface="Consolas" charset="0"/>
+                <a:cs typeface="Consolas" charset="0"/>
+              </a:rPr>
+              <a:t>	statement2</a:t>
+            </a:r>
+          </a:p>
+          <a:p>
+            <a:pPr marL="0" indent="0">
+              <a:buNone/>
+            </a:pPr>
+            <a:r>
+              <a:rPr lang="en-US" dirty="0">
+                <a:latin typeface="Consolas" charset="0"/>
+                <a:ea typeface="Consolas" charset="0"/>
+                <a:cs typeface="Consolas" charset="0"/>
+              </a:rPr>
+              <a:t>	</a:t>
+            </a:r>
+            <a:r>
+              <a:rPr lang="en-US" dirty="0" err="1" smtClean="0">
+                <a:latin typeface="Consolas" charset="0"/>
+                <a:ea typeface="Consolas" charset="0"/>
+                <a:cs typeface="Consolas" charset="0"/>
+              </a:rPr>
+              <a:t>elif</a:t>
+            </a:r>
+            <a:r>
+              <a:rPr lang="en-US" dirty="0" smtClean="0">
+                <a:latin typeface="Consolas" charset="0"/>
+                <a:ea typeface="Consolas" charset="0"/>
+                <a:cs typeface="Consolas" charset="0"/>
+              </a:rPr>
+              <a:t> </a:t>
+            </a:r>
+            <a:r>
+              <a:rPr lang="en-US" i="1" dirty="0" smtClean="0">
+                <a:latin typeface="Consolas" charset="0"/>
+                <a:ea typeface="Consolas" charset="0"/>
+                <a:cs typeface="Consolas" charset="0"/>
+              </a:rPr>
+              <a:t>condition2</a:t>
+            </a:r>
+          </a:p>
+          <a:p>
+            <a:pPr marL="0" indent="0">
+              <a:buNone/>
+            </a:pPr>
+            <a:r>
+              <a:rPr lang="en-US" dirty="0">
+                <a:latin typeface="Consolas" charset="0"/>
+                <a:ea typeface="Consolas" charset="0"/>
+                <a:cs typeface="Consolas" charset="0"/>
+              </a:rPr>
+              <a:t>	</a:t>
+            </a:r>
+            <a:r>
+              <a:rPr lang="en-US" dirty="0" smtClean="0">
+                <a:latin typeface="Consolas" charset="0"/>
+                <a:ea typeface="Consolas" charset="0"/>
+                <a:cs typeface="Consolas" charset="0"/>
+              </a:rPr>
+              <a:t>else</a:t>
+            </a:r>
+          </a:p>
+          <a:p>
+            <a:pPr marL="0" indent="0">
+              <a:buNone/>
+            </a:pPr>
+            <a:r>
+              <a:rPr lang="en-US" dirty="0">
+                <a:latin typeface="Consolas" charset="0"/>
+                <a:ea typeface="Consolas" charset="0"/>
+                <a:cs typeface="Consolas" charset="0"/>
+              </a:rPr>
+              <a:t>	</a:t>
+            </a:r>
+            <a:r>
+              <a:rPr lang="en-US" dirty="0" smtClean="0">
+                <a:latin typeface="Consolas" charset="0"/>
+                <a:ea typeface="Consolas" charset="0"/>
+                <a:cs typeface="Consolas" charset="0"/>
+              </a:rPr>
+              <a:t>	statement3</a:t>
+            </a:r>
+          </a:p>
+          <a:p>
+            <a:pPr marL="0" indent="0">
+              <a:buNone/>
+            </a:pPr>
+            <a:r>
+              <a:rPr lang="en-US" dirty="0">
+                <a:latin typeface="Consolas" charset="0"/>
+                <a:ea typeface="Consolas" charset="0"/>
+                <a:cs typeface="Consolas" charset="0"/>
+              </a:rPr>
+              <a:t>	</a:t>
+            </a:r>
+            <a:r>
+              <a:rPr lang="en-US" dirty="0" smtClean="0">
+                <a:latin typeface="Consolas" charset="0"/>
+                <a:ea typeface="Consolas" charset="0"/>
+                <a:cs typeface="Consolas" charset="0"/>
+              </a:rPr>
+              <a:t>fi</a:t>
+            </a:r>
+          </a:p>
+          <a:p>
+            <a:pPr marL="0" indent="0">
+              <a:buNone/>
+            </a:pPr>
+            <a:endParaRPr lang="en-US" dirty="0" smtClean="0">
+              <a:latin typeface="Consolas" charset="0"/>
+              <a:ea typeface="Consolas" charset="0"/>
+              <a:cs typeface="Consolas" charset="0"/>
+            </a:endParaRPr>
+          </a:p>
+          <a:p>
+            <a:r>
+              <a:rPr lang="en-US" dirty="0" smtClean="0"/>
+              <a:t>Statement #1 &amp; #2 are executed if condition1 is true.</a:t>
+            </a:r>
+          </a:p>
+          <a:p>
+            <a:endParaRPr lang="en-US" dirty="0"/>
+          </a:p>
+          <a:p>
+            <a:r>
+              <a:rPr lang="en-US" dirty="0" smtClean="0"/>
+              <a:t>The condition is typically written in the form: [operand1 operator operand2]</a:t>
+            </a:r>
+          </a:p>
+          <a:p>
+            <a:pPr marL="400050" lvl="1" indent="0">
+              <a:buNone/>
+            </a:pPr>
+            <a:r>
+              <a:rPr lang="en-US" dirty="0">
+                <a:latin typeface="Consolas" charset="0"/>
+                <a:ea typeface="Consolas" charset="0"/>
+                <a:cs typeface="Consolas" charset="0"/>
+              </a:rPr>
+              <a:t>i</a:t>
+            </a:r>
+            <a:r>
+              <a:rPr lang="en-US" dirty="0" smtClean="0">
+                <a:latin typeface="Consolas" charset="0"/>
+                <a:ea typeface="Consolas" charset="0"/>
+                <a:cs typeface="Consolas" charset="0"/>
+              </a:rPr>
+              <a:t>f [ $X –</a:t>
+            </a:r>
+            <a:r>
+              <a:rPr lang="en-US" dirty="0" err="1" smtClean="0">
+                <a:latin typeface="Consolas" charset="0"/>
+                <a:ea typeface="Consolas" charset="0"/>
+                <a:cs typeface="Consolas" charset="0"/>
+              </a:rPr>
+              <a:t>lt</a:t>
+            </a:r>
+            <a:r>
+              <a:rPr lang="en-US" dirty="0" smtClean="0">
+                <a:latin typeface="Consolas" charset="0"/>
+                <a:ea typeface="Consolas" charset="0"/>
+                <a:cs typeface="Consolas" charset="0"/>
+              </a:rPr>
+              <a:t> $Y ]</a:t>
+            </a:r>
+            <a:r>
+              <a:rPr lang="en-US" dirty="0" smtClean="0"/>
+              <a:t>		# if $X is less than $Y</a:t>
+            </a:r>
+          </a:p>
+          <a:p>
+            <a:pPr marL="400050" lvl="1" indent="0">
+              <a:buNone/>
+            </a:pPr>
+            <a:r>
+              <a:rPr lang="en-US" dirty="0">
+                <a:latin typeface="Consolas" charset="0"/>
+                <a:ea typeface="Consolas" charset="0"/>
+                <a:cs typeface="Consolas" charset="0"/>
+              </a:rPr>
+              <a:t>i</a:t>
+            </a:r>
+            <a:r>
+              <a:rPr lang="en-US" dirty="0" smtClean="0">
+                <a:latin typeface="Consolas" charset="0"/>
+                <a:ea typeface="Consolas" charset="0"/>
+                <a:cs typeface="Consolas" charset="0"/>
+              </a:rPr>
+              <a:t>f [ -n “$X” ]    </a:t>
+            </a:r>
+            <a:r>
+              <a:rPr lang="en-US" dirty="0" smtClean="0"/>
+              <a:t>	# if $X is not empty</a:t>
+            </a:r>
+          </a:p>
+          <a:p>
+            <a:pPr marL="400050" lvl="1" indent="0">
+              <a:buNone/>
+            </a:pPr>
+            <a:r>
+              <a:rPr lang="en-US" dirty="0">
+                <a:latin typeface="Consolas" charset="0"/>
+                <a:ea typeface="Consolas" charset="0"/>
+                <a:cs typeface="Consolas" charset="0"/>
+              </a:rPr>
+              <a:t>i</a:t>
+            </a:r>
+            <a:r>
+              <a:rPr lang="en-US" dirty="0" smtClean="0">
+                <a:latin typeface="Consolas" charset="0"/>
+                <a:ea typeface="Consolas" charset="0"/>
+                <a:cs typeface="Consolas" charset="0"/>
+              </a:rPr>
+              <a:t>f [ -z “$X” ]</a:t>
+            </a:r>
+            <a:r>
+              <a:rPr lang="en-US" dirty="0" smtClean="0"/>
+              <a:t>		# if $X is empty</a:t>
+            </a:r>
+          </a:p>
+          <a:p>
+            <a:pPr marL="400050" lvl="1" indent="0">
+              <a:buNone/>
+            </a:pPr>
+            <a:r>
+              <a:rPr lang="en-US" dirty="0">
+                <a:latin typeface="Consolas" charset="0"/>
+                <a:ea typeface="Consolas" charset="0"/>
+                <a:cs typeface="Consolas" charset="0"/>
+              </a:rPr>
+              <a:t>i</a:t>
+            </a:r>
+            <a:r>
+              <a:rPr lang="en-US" dirty="0" smtClean="0">
+                <a:latin typeface="Consolas" charset="0"/>
+                <a:ea typeface="Consolas" charset="0"/>
+                <a:cs typeface="Consolas" charset="0"/>
+              </a:rPr>
+              <a:t>f [ $X = $Y ]	</a:t>
+            </a:r>
+            <a:r>
+              <a:rPr lang="en-US" dirty="0" smtClean="0"/>
+              <a:t>	$ if $X equals $Y</a:t>
+            </a:r>
+          </a:p>
+          <a:p>
+            <a:pPr marL="400050" lvl="1" indent="0">
+              <a:buNone/>
+            </a:pPr>
+            <a:endParaRPr lang="en-US" dirty="0" smtClean="0"/>
+          </a:p>
+          <a:p>
+            <a:pPr marL="857250" lvl="1" indent="-457200"/>
+            <a:r>
+              <a:rPr lang="en-US" dirty="0" smtClean="0"/>
+              <a:t>Note: The spaces in the test bracket </a:t>
+            </a:r>
+            <a:r>
+              <a:rPr lang="en-US" u="sng" dirty="0" smtClean="0"/>
+              <a:t>really</a:t>
+            </a:r>
+            <a:r>
+              <a:rPr lang="en-US" dirty="0" smtClean="0"/>
+              <a:t> matter!</a:t>
+            </a:r>
+          </a:p>
+          <a:p>
+            <a:pPr marL="0" indent="0">
+              <a:buNone/>
+            </a:pPr>
+            <a:endParaRPr lang="en-US" dirty="0"/>
+          </a:p>
+        </p:txBody>
+      </p:sp>
+    </p:spTree>
+    <p:extLst>
+      <p:ext uri="{BB962C8B-B14F-4D97-AF65-F5344CB8AC3E}">
+        <p14:creationId xmlns:p14="http://schemas.microsoft.com/office/powerpoint/2010/main" val="1853789404"/>
+      </p:ext>
+    </p:extLst>
+  </p:cSld>
+  <p:clrMapOvr>
+    <a:masterClrMapping/>
+  </p:clrMapOvr>
+</p:sld>
+</file>
+
+<file path=ppt/slides/slide15.xml><?xml version="1.0" encoding="utf-8"?>
+<p:sld xmlns:a="http://schemas.openxmlformats.org/drawingml/2006/main" xmlns:r="http://schemas.openxmlformats.org/officeDocument/2006/relationships" xmlns:p="http://schemas.openxmlformats.org/presentationml/2006/main">
+  <p:cSld>
+    <p:spTree>
+      <p:nvGrpSpPr>
+        <p:cNvPr id="1" name=""/>
+        <p:cNvGrpSpPr/>
+        <p:nvPr/>
+      </p:nvGrpSpPr>
+      <p:grpSpPr>
+        <a:xfrm>
+          <a:off x="0" y="0"/>
+          <a:ext cx="0" cy="0"/>
+          <a:chOff x="0" y="0"/>
+          <a:chExt cx="0" cy="0"/>
+        </a:xfrm>
+      </p:grpSpPr>
+      <p:sp>
+        <p:nvSpPr>
+          <p:cNvPr id="2" name="Title 1"/>
+          <p:cNvSpPr>
+            <a:spLocks noGrp="1"/>
+          </p:cNvSpPr>
+          <p:nvPr>
+            <p:ph type="title"/>
+          </p:nvPr>
+        </p:nvSpPr>
+        <p:spPr/>
+        <p:txBody>
+          <a:bodyPr/>
+          <a:lstStyle/>
+          <a:p>
+            <a:r>
+              <a:rPr lang="en-US" dirty="0" smtClean="0"/>
+              <a:t>Shell loops</a:t>
+            </a:r>
+            <a:endParaRPr lang="en-US" dirty="0"/>
+          </a:p>
+        </p:txBody>
+      </p:sp>
+      <p:sp>
+        <p:nvSpPr>
+          <p:cNvPr id="3" name="Content Placeholder 2"/>
+          <p:cNvSpPr>
+            <a:spLocks noGrp="1"/>
+          </p:cNvSpPr>
+          <p:nvPr>
+            <p:ph idx="1"/>
+          </p:nvPr>
+        </p:nvSpPr>
+        <p:spPr>
+          <a:xfrm>
+            <a:off x="457200" y="1600200"/>
+            <a:ext cx="8229600" cy="4905103"/>
+          </a:xfrm>
+        </p:spPr>
+        <p:txBody>
+          <a:bodyPr>
+            <a:normAutofit fontScale="70000" lnSpcReduction="20000"/>
+          </a:bodyPr>
+          <a:lstStyle/>
+          <a:p>
+            <a:r>
+              <a:rPr lang="en-US" dirty="0" smtClean="0"/>
+              <a:t>Loops allow the script to execute a series of commands multiple times</a:t>
+            </a:r>
+          </a:p>
+          <a:p>
+            <a:r>
+              <a:rPr lang="en-US" dirty="0"/>
+              <a:t>f</a:t>
+            </a:r>
+            <a:r>
+              <a:rPr lang="en-US" dirty="0" smtClean="0"/>
+              <a:t>or loops</a:t>
+            </a:r>
+          </a:p>
+          <a:p>
+            <a:endParaRPr lang="en-US" dirty="0" smtClean="0"/>
+          </a:p>
+          <a:p>
+            <a:pPr marL="400050" lvl="1" indent="0">
+              <a:buNone/>
+            </a:pPr>
+            <a:r>
+              <a:rPr lang="en-US" dirty="0">
+                <a:latin typeface="Consolas" charset="0"/>
+                <a:ea typeface="Consolas" charset="0"/>
+                <a:cs typeface="Consolas" charset="0"/>
+              </a:rPr>
+              <a:t>f</a:t>
+            </a:r>
+            <a:r>
+              <a:rPr lang="en-US" dirty="0" smtClean="0">
+                <a:latin typeface="Consolas" charset="0"/>
+                <a:ea typeface="Consolas" charset="0"/>
+                <a:cs typeface="Consolas" charset="0"/>
+              </a:rPr>
+              <a:t>or </a:t>
+            </a:r>
+            <a:r>
+              <a:rPr lang="en-US" dirty="0" err="1" smtClean="0">
+                <a:latin typeface="Consolas" charset="0"/>
+                <a:ea typeface="Consolas" charset="0"/>
+                <a:cs typeface="Consolas" charset="0"/>
+              </a:rPr>
+              <a:t>arg</a:t>
+            </a:r>
+            <a:r>
+              <a:rPr lang="en-US" dirty="0" smtClean="0">
+                <a:latin typeface="Consolas" charset="0"/>
+                <a:ea typeface="Consolas" charset="0"/>
+                <a:cs typeface="Consolas" charset="0"/>
+              </a:rPr>
+              <a:t> in [list]</a:t>
+            </a:r>
+          </a:p>
+          <a:p>
+            <a:pPr marL="400050" lvl="1" indent="0">
+              <a:buNone/>
+            </a:pPr>
+            <a:r>
+              <a:rPr lang="en-US" dirty="0">
+                <a:latin typeface="Consolas" charset="0"/>
+                <a:ea typeface="Consolas" charset="0"/>
+                <a:cs typeface="Consolas" charset="0"/>
+              </a:rPr>
+              <a:t>d</a:t>
+            </a:r>
+            <a:r>
+              <a:rPr lang="en-US" dirty="0" smtClean="0">
+                <a:latin typeface="Consolas" charset="0"/>
+                <a:ea typeface="Consolas" charset="0"/>
+                <a:cs typeface="Consolas" charset="0"/>
+              </a:rPr>
+              <a:t>o</a:t>
+            </a:r>
+          </a:p>
+          <a:p>
+            <a:pPr marL="857250" lvl="2" indent="0">
+              <a:buNone/>
+            </a:pPr>
+            <a:r>
+              <a:rPr lang="en-US" dirty="0">
+                <a:latin typeface="Consolas" charset="0"/>
+                <a:ea typeface="Consolas" charset="0"/>
+                <a:cs typeface="Consolas" charset="0"/>
+              </a:rPr>
+              <a:t>c</a:t>
+            </a:r>
+            <a:r>
+              <a:rPr lang="en-US" dirty="0" smtClean="0">
+                <a:latin typeface="Consolas" charset="0"/>
+                <a:ea typeface="Consolas" charset="0"/>
+                <a:cs typeface="Consolas" charset="0"/>
+              </a:rPr>
+              <a:t>ommands(s)</a:t>
+            </a:r>
+            <a:r>
+              <a:rPr lang="is-IS" dirty="0" smtClean="0">
+                <a:latin typeface="Consolas" charset="0"/>
+                <a:ea typeface="Consolas" charset="0"/>
+                <a:cs typeface="Consolas" charset="0"/>
+              </a:rPr>
+              <a:t>…</a:t>
+            </a:r>
+          </a:p>
+          <a:p>
+            <a:pPr marL="400050" lvl="1" indent="0">
+              <a:buNone/>
+            </a:pPr>
+            <a:r>
+              <a:rPr lang="en-US" dirty="0">
+                <a:latin typeface="Consolas" charset="0"/>
+                <a:ea typeface="Consolas" charset="0"/>
+                <a:cs typeface="Consolas" charset="0"/>
+              </a:rPr>
+              <a:t>d</a:t>
+            </a:r>
+            <a:r>
+              <a:rPr lang="is-IS" dirty="0" smtClean="0">
+                <a:latin typeface="Consolas" charset="0"/>
+                <a:ea typeface="Consolas" charset="0"/>
+                <a:cs typeface="Consolas" charset="0"/>
+              </a:rPr>
+              <a:t>one</a:t>
+            </a:r>
+          </a:p>
+          <a:p>
+            <a:pPr marL="400050" lvl="1" indent="0">
+              <a:buNone/>
+            </a:pPr>
+            <a:endParaRPr lang="is-IS" dirty="0" smtClean="0"/>
+          </a:p>
+          <a:p>
+            <a:pPr marL="457200" indent="-457200"/>
+            <a:r>
+              <a:rPr lang="is-IS" dirty="0" smtClean="0"/>
+              <a:t>Example:</a:t>
+            </a:r>
+          </a:p>
+          <a:p>
+            <a:pPr marL="457200" indent="-457200"/>
+            <a:endParaRPr lang="is-IS" dirty="0" smtClean="0"/>
+          </a:p>
+          <a:p>
+            <a:pPr marL="400050" lvl="1" indent="0">
+              <a:buNone/>
+            </a:pPr>
+            <a:r>
+              <a:rPr lang="en-US" dirty="0" smtClean="0">
+                <a:latin typeface="Consolas" charset="0"/>
+                <a:ea typeface="Consolas" charset="0"/>
+                <a:cs typeface="Consolas" charset="0"/>
+              </a:rPr>
+              <a:t>for planet in Mercury Venus Earth Mars</a:t>
+            </a:r>
+          </a:p>
+          <a:p>
+            <a:pPr marL="400050" lvl="1" indent="0">
+              <a:buNone/>
+            </a:pPr>
+            <a:r>
+              <a:rPr lang="en-US" dirty="0">
+                <a:latin typeface="Consolas" charset="0"/>
+                <a:ea typeface="Consolas" charset="0"/>
+                <a:cs typeface="Consolas" charset="0"/>
+              </a:rPr>
+              <a:t>d</a:t>
+            </a:r>
+            <a:r>
+              <a:rPr lang="en-US" dirty="0" smtClean="0">
+                <a:latin typeface="Consolas" charset="0"/>
+                <a:ea typeface="Consolas" charset="0"/>
+                <a:cs typeface="Consolas" charset="0"/>
+              </a:rPr>
+              <a:t>o</a:t>
+            </a:r>
+          </a:p>
+          <a:p>
+            <a:pPr marL="800100" lvl="2" indent="0">
+              <a:buNone/>
+            </a:pPr>
+            <a:r>
+              <a:rPr lang="en-US" dirty="0">
+                <a:latin typeface="Consolas" charset="0"/>
+                <a:ea typeface="Consolas" charset="0"/>
+                <a:cs typeface="Consolas" charset="0"/>
+              </a:rPr>
+              <a:t>e</a:t>
+            </a:r>
+            <a:r>
+              <a:rPr lang="en-US" dirty="0" smtClean="0">
+                <a:latin typeface="Consolas" charset="0"/>
+                <a:ea typeface="Consolas" charset="0"/>
+                <a:cs typeface="Consolas" charset="0"/>
+              </a:rPr>
+              <a:t>cho $planet</a:t>
+            </a:r>
+          </a:p>
+          <a:p>
+            <a:pPr marL="400050" lvl="1" indent="0">
+              <a:buNone/>
+            </a:pPr>
+            <a:r>
+              <a:rPr lang="en-US" dirty="0" smtClean="0">
+                <a:latin typeface="Consolas" charset="0"/>
+                <a:ea typeface="Consolas" charset="0"/>
+                <a:cs typeface="Consolas" charset="0"/>
+              </a:rPr>
+              <a:t>done</a:t>
+            </a:r>
+            <a:endParaRPr lang="en-US" dirty="0">
+              <a:latin typeface="Consolas" charset="0"/>
+              <a:ea typeface="Consolas" charset="0"/>
+              <a:cs typeface="Consolas" charset="0"/>
+            </a:endParaRPr>
+          </a:p>
+        </p:txBody>
+      </p:sp>
+    </p:spTree>
+    <p:extLst>
+      <p:ext uri="{BB962C8B-B14F-4D97-AF65-F5344CB8AC3E}">
+        <p14:creationId xmlns:p14="http://schemas.microsoft.com/office/powerpoint/2010/main" val="1986292723"/>
+      </p:ext>
+    </p:extLst>
+  </p:cSld>
+  <p:clrMapOvr>
+    <a:masterClrMapping/>
+  </p:clrMapOvr>
+</p:sld>
+</file>
+
+<file path=ppt/slides/slide16.xml><?xml version="1.0" encoding="utf-8"?>
+<p:sld xmlns:a="http://schemas.openxmlformats.org/drawingml/2006/main" xmlns:r="http://schemas.openxmlformats.org/officeDocument/2006/relationships" xmlns:p="http://schemas.openxmlformats.org/presentationml/2006/main">
+  <p:cSld>
+    <p:spTree>
+      <p:nvGrpSpPr>
+        <p:cNvPr id="1" name=""/>
+        <p:cNvGrpSpPr/>
+        <p:nvPr/>
+      </p:nvGrpSpPr>
+      <p:grpSpPr>
+        <a:xfrm>
+          <a:off x="0" y="0"/>
+          <a:ext cx="0" cy="0"/>
+          <a:chOff x="0" y="0"/>
+          <a:chExt cx="0" cy="0"/>
+        </a:xfrm>
+      </p:grpSpPr>
+      <p:sp>
+        <p:nvSpPr>
+          <p:cNvPr id="2" name="Title 1"/>
+          <p:cNvSpPr>
+            <a:spLocks noGrp="1"/>
+          </p:cNvSpPr>
+          <p:nvPr>
+            <p:ph type="title"/>
+          </p:nvPr>
+        </p:nvSpPr>
+        <p:spPr/>
+        <p:txBody>
+          <a:bodyPr/>
+          <a:lstStyle/>
+          <a:p>
+            <a:r>
+              <a:rPr lang="en-US" dirty="0" smtClean="0"/>
+              <a:t>Shell loops</a:t>
+            </a:r>
+            <a:endParaRPr lang="en-US" dirty="0"/>
+          </a:p>
+        </p:txBody>
+      </p:sp>
+      <p:sp>
+        <p:nvSpPr>
+          <p:cNvPr id="3" name="Content Placeholder 2"/>
+          <p:cNvSpPr>
+            <a:spLocks noGrp="1"/>
+          </p:cNvSpPr>
+          <p:nvPr>
+            <p:ph idx="1"/>
+          </p:nvPr>
+        </p:nvSpPr>
+        <p:spPr>
+          <a:xfrm>
+            <a:off x="457200" y="1600200"/>
+            <a:ext cx="8229600" cy="5101046"/>
+          </a:xfrm>
+        </p:spPr>
+        <p:txBody>
+          <a:bodyPr>
+            <a:normAutofit fontScale="62500" lnSpcReduction="20000"/>
+          </a:bodyPr>
+          <a:lstStyle/>
+          <a:p>
+            <a:r>
+              <a:rPr lang="en-US" dirty="0"/>
+              <a:t>w</a:t>
+            </a:r>
+            <a:r>
+              <a:rPr lang="en-US" dirty="0" smtClean="0"/>
+              <a:t>hile loop</a:t>
+            </a:r>
+          </a:p>
+          <a:p>
+            <a:endParaRPr lang="en-US" dirty="0" smtClean="0"/>
+          </a:p>
+          <a:p>
+            <a:pPr marL="400050" lvl="1" indent="0">
+              <a:buNone/>
+            </a:pPr>
+            <a:r>
+              <a:rPr lang="en-US" dirty="0">
+                <a:latin typeface="Consolas" charset="0"/>
+                <a:ea typeface="Consolas" charset="0"/>
+                <a:cs typeface="Consolas" charset="0"/>
+              </a:rPr>
+              <a:t>w</a:t>
+            </a:r>
+            <a:r>
+              <a:rPr lang="en-US" dirty="0" smtClean="0">
+                <a:latin typeface="Consolas" charset="0"/>
+                <a:ea typeface="Consolas" charset="0"/>
+                <a:cs typeface="Consolas" charset="0"/>
+              </a:rPr>
+              <a:t>hile [ condition ]</a:t>
+            </a:r>
+          </a:p>
+          <a:p>
+            <a:pPr marL="400050" lvl="1" indent="0">
+              <a:buNone/>
+            </a:pPr>
+            <a:r>
+              <a:rPr lang="en-US" dirty="0">
+                <a:latin typeface="Consolas" charset="0"/>
+                <a:ea typeface="Consolas" charset="0"/>
+                <a:cs typeface="Consolas" charset="0"/>
+              </a:rPr>
+              <a:t>d</a:t>
+            </a:r>
+            <a:r>
+              <a:rPr lang="en-US" dirty="0" smtClean="0">
+                <a:latin typeface="Consolas" charset="0"/>
+                <a:ea typeface="Consolas" charset="0"/>
+                <a:cs typeface="Consolas" charset="0"/>
+              </a:rPr>
+              <a:t>o</a:t>
+            </a:r>
+          </a:p>
+          <a:p>
+            <a:pPr marL="857250" lvl="2" indent="0">
+              <a:buNone/>
+            </a:pPr>
+            <a:r>
+              <a:rPr lang="en-US" dirty="0">
+                <a:latin typeface="Consolas" charset="0"/>
+                <a:ea typeface="Consolas" charset="0"/>
+                <a:cs typeface="Consolas" charset="0"/>
+              </a:rPr>
+              <a:t>c</a:t>
+            </a:r>
+            <a:r>
+              <a:rPr lang="en-US" dirty="0" smtClean="0">
+                <a:latin typeface="Consolas" charset="0"/>
+                <a:ea typeface="Consolas" charset="0"/>
+                <a:cs typeface="Consolas" charset="0"/>
+              </a:rPr>
+              <a:t>ommand(s)</a:t>
+            </a:r>
+            <a:r>
+              <a:rPr lang="is-IS" dirty="0" smtClean="0">
+                <a:latin typeface="Consolas" charset="0"/>
+                <a:ea typeface="Consolas" charset="0"/>
+                <a:cs typeface="Consolas" charset="0"/>
+              </a:rPr>
+              <a:t>…</a:t>
+            </a:r>
+          </a:p>
+          <a:p>
+            <a:pPr marL="400050" lvl="1" indent="0">
+              <a:buNone/>
+            </a:pPr>
+            <a:r>
+              <a:rPr lang="en-US" dirty="0">
+                <a:latin typeface="Consolas" charset="0"/>
+                <a:ea typeface="Consolas" charset="0"/>
+                <a:cs typeface="Consolas" charset="0"/>
+              </a:rPr>
+              <a:t>d</a:t>
+            </a:r>
+            <a:r>
+              <a:rPr lang="is-IS" dirty="0" smtClean="0">
+                <a:latin typeface="Consolas" charset="0"/>
+                <a:ea typeface="Consolas" charset="0"/>
+                <a:cs typeface="Consolas" charset="0"/>
+              </a:rPr>
+              <a:t>one</a:t>
+            </a:r>
+          </a:p>
+          <a:p>
+            <a:pPr marL="400050" lvl="1" indent="0">
+              <a:buNone/>
+            </a:pPr>
+            <a:endParaRPr lang="is-IS" dirty="0" smtClean="0"/>
+          </a:p>
+          <a:p>
+            <a:r>
+              <a:rPr lang="en-US" dirty="0" smtClean="0"/>
+              <a:t>Example:</a:t>
+            </a:r>
+          </a:p>
+          <a:p>
+            <a:endParaRPr lang="en-US" dirty="0" smtClean="0"/>
+          </a:p>
+          <a:p>
+            <a:pPr marL="400050" lvl="1" indent="0">
+              <a:buNone/>
+            </a:pPr>
+            <a:r>
+              <a:rPr lang="en-US" dirty="0" smtClean="0">
+                <a:latin typeface="Consolas" charset="0"/>
+                <a:ea typeface="Consolas" charset="0"/>
+                <a:cs typeface="Consolas" charset="0"/>
+              </a:rPr>
+              <a:t>#!/bin/bash</a:t>
+            </a:r>
+          </a:p>
+          <a:p>
+            <a:pPr marL="400050" lvl="1" indent="0">
+              <a:buNone/>
+            </a:pPr>
+            <a:r>
+              <a:rPr lang="en-US" dirty="0" smtClean="0">
+                <a:latin typeface="Consolas" charset="0"/>
+                <a:ea typeface="Consolas" charset="0"/>
+                <a:cs typeface="Consolas" charset="0"/>
+              </a:rPr>
+              <a:t>X=0</a:t>
+            </a:r>
+          </a:p>
+          <a:p>
+            <a:pPr marL="400050" lvl="1" indent="0">
+              <a:buNone/>
+            </a:pPr>
+            <a:r>
+              <a:rPr lang="en-US" dirty="0" smtClean="0">
+                <a:latin typeface="Consolas" charset="0"/>
+                <a:ea typeface="Consolas" charset="0"/>
+                <a:cs typeface="Consolas" charset="0"/>
+              </a:rPr>
+              <a:t>Y=5</a:t>
+            </a:r>
+          </a:p>
+          <a:p>
+            <a:pPr marL="400050" lvl="1" indent="0">
+              <a:buNone/>
+            </a:pPr>
+            <a:r>
+              <a:rPr lang="en-US" dirty="0">
+                <a:latin typeface="Consolas" charset="0"/>
+                <a:ea typeface="Consolas" charset="0"/>
+                <a:cs typeface="Consolas" charset="0"/>
+              </a:rPr>
+              <a:t>w</a:t>
+            </a:r>
+            <a:r>
+              <a:rPr lang="en-US" dirty="0" smtClean="0">
+                <a:latin typeface="Consolas" charset="0"/>
+                <a:ea typeface="Consolas" charset="0"/>
+                <a:cs typeface="Consolas" charset="0"/>
+              </a:rPr>
+              <a:t>hile [ ”$X” –</a:t>
+            </a:r>
+            <a:r>
+              <a:rPr lang="en-US" dirty="0" err="1" smtClean="0">
+                <a:latin typeface="Consolas" charset="0"/>
+                <a:ea typeface="Consolas" charset="0"/>
+                <a:cs typeface="Consolas" charset="0"/>
+              </a:rPr>
+              <a:t>lt</a:t>
+            </a:r>
+            <a:r>
+              <a:rPr lang="en-US" dirty="0" smtClean="0">
+                <a:latin typeface="Consolas" charset="0"/>
+                <a:ea typeface="Consolas" charset="0"/>
+                <a:cs typeface="Consolas" charset="0"/>
+              </a:rPr>
+              <a:t> “$Y” ]</a:t>
+            </a:r>
+          </a:p>
+          <a:p>
+            <a:pPr marL="400050" lvl="1" indent="0">
+              <a:buNone/>
+            </a:pPr>
+            <a:r>
+              <a:rPr lang="en-US" dirty="0">
+                <a:latin typeface="Consolas" charset="0"/>
+                <a:ea typeface="Consolas" charset="0"/>
+                <a:cs typeface="Consolas" charset="0"/>
+              </a:rPr>
+              <a:t>d</a:t>
+            </a:r>
+            <a:r>
+              <a:rPr lang="en-US" dirty="0" smtClean="0">
+                <a:latin typeface="Consolas" charset="0"/>
+                <a:ea typeface="Consolas" charset="0"/>
+                <a:cs typeface="Consolas" charset="0"/>
+              </a:rPr>
+              <a:t>o</a:t>
+            </a:r>
+          </a:p>
+          <a:p>
+            <a:pPr marL="400050" lvl="1" indent="0">
+              <a:buNone/>
+            </a:pPr>
+            <a:r>
+              <a:rPr lang="en-US" dirty="0">
+                <a:latin typeface="Consolas" charset="0"/>
+                <a:ea typeface="Consolas" charset="0"/>
+                <a:cs typeface="Consolas" charset="0"/>
+              </a:rPr>
+              <a:t>	</a:t>
+            </a:r>
+            <a:r>
+              <a:rPr lang="en-US" dirty="0" smtClean="0">
+                <a:latin typeface="Consolas" charset="0"/>
+                <a:ea typeface="Consolas" charset="0"/>
+                <a:cs typeface="Consolas" charset="0"/>
+              </a:rPr>
+              <a:t>echo “$X”</a:t>
+            </a:r>
+          </a:p>
+          <a:p>
+            <a:pPr marL="400050" lvl="1" indent="0">
+              <a:buNone/>
+            </a:pPr>
+            <a:r>
+              <a:rPr lang="en-US" dirty="0">
+                <a:latin typeface="Consolas" charset="0"/>
+                <a:ea typeface="Consolas" charset="0"/>
+                <a:cs typeface="Consolas" charset="0"/>
+              </a:rPr>
+              <a:t>	</a:t>
+            </a:r>
+            <a:r>
+              <a:rPr lang="en-US" dirty="0" smtClean="0">
+                <a:latin typeface="Consolas" charset="0"/>
+                <a:ea typeface="Consolas" charset="0"/>
+                <a:cs typeface="Consolas" charset="0"/>
+              </a:rPr>
+              <a:t>let X=X+1</a:t>
+            </a:r>
+          </a:p>
+          <a:p>
+            <a:pPr marL="400050" lvl="1" indent="0">
+              <a:buNone/>
+            </a:pPr>
+            <a:r>
+              <a:rPr lang="en-US" dirty="0">
+                <a:latin typeface="Consolas" charset="0"/>
+                <a:ea typeface="Consolas" charset="0"/>
+                <a:cs typeface="Consolas" charset="0"/>
+              </a:rPr>
+              <a:t>d</a:t>
+            </a:r>
+            <a:r>
+              <a:rPr lang="en-US" dirty="0" smtClean="0">
+                <a:latin typeface="Consolas" charset="0"/>
+                <a:ea typeface="Consolas" charset="0"/>
+                <a:cs typeface="Consolas" charset="0"/>
+              </a:rPr>
+              <a:t>one</a:t>
+            </a:r>
+          </a:p>
+          <a:p>
+            <a:pPr marL="400050" lvl="1" indent="0">
+              <a:buNone/>
+            </a:pPr>
+            <a:r>
+              <a:rPr lang="en-US" dirty="0">
+                <a:latin typeface="Consolas" charset="0"/>
+                <a:ea typeface="Consolas" charset="0"/>
+                <a:cs typeface="Consolas" charset="0"/>
+              </a:rPr>
+              <a:t>e</a:t>
+            </a:r>
+            <a:r>
+              <a:rPr lang="en-US" dirty="0" smtClean="0">
+                <a:latin typeface="Consolas" charset="0"/>
+                <a:ea typeface="Consolas" charset="0"/>
+                <a:cs typeface="Consolas" charset="0"/>
+              </a:rPr>
+              <a:t>xit 0</a:t>
+            </a:r>
+          </a:p>
+        </p:txBody>
+      </p:sp>
+    </p:spTree>
+    <p:extLst>
+      <p:ext uri="{BB962C8B-B14F-4D97-AF65-F5344CB8AC3E}">
+        <p14:creationId xmlns:p14="http://schemas.microsoft.com/office/powerpoint/2010/main" val="1164263910"/>
+      </p:ext>
+    </p:extLst>
+  </p:cSld>
+  <p:clrMapOvr>
+    <a:masterClrMapping/>
+  </p:clrMapOvr>
+</p:sld>
+</file>
+
+<file path=ppt/slides/slide17.xml><?xml version="1.0" encoding="utf-8"?>
+<p:sld xmlns:a="http://schemas.openxmlformats.org/drawingml/2006/main" xmlns:r="http://schemas.openxmlformats.org/officeDocument/2006/relationships" xmlns:p="http://schemas.openxmlformats.org/presentationml/2006/main">
+  <p:cSld>
+    <p:spTree>
+      <p:nvGrpSpPr>
+        <p:cNvPr id="1" name=""/>
+        <p:cNvGrpSpPr/>
+        <p:nvPr/>
+      </p:nvGrpSpPr>
+      <p:grpSpPr>
+        <a:xfrm>
+          <a:off x="0" y="0"/>
+          <a:ext cx="0" cy="0"/>
+          <a:chOff x="0" y="0"/>
+          <a:chExt cx="0" cy="0"/>
+        </a:xfrm>
+      </p:grpSpPr>
+      <p:sp>
+        <p:nvSpPr>
+          <p:cNvPr id="2" name="Title 1"/>
+          <p:cNvSpPr>
+            <a:spLocks noGrp="1"/>
+          </p:cNvSpPr>
+          <p:nvPr>
+            <p:ph type="title"/>
+          </p:nvPr>
+        </p:nvSpPr>
+        <p:spPr/>
+        <p:txBody>
+          <a:bodyPr/>
+          <a:lstStyle/>
+          <a:p>
+            <a:r>
+              <a:rPr lang="en-US" dirty="0" smtClean="0"/>
+              <a:t>Shell loop </a:t>
+            </a:r>
+            <a:r>
+              <a:rPr lang="en-US" dirty="0" err="1" smtClean="0"/>
+              <a:t>globbing</a:t>
+            </a:r>
+            <a:endParaRPr lang="en-US" dirty="0"/>
+          </a:p>
+        </p:txBody>
+      </p:sp>
+      <p:sp>
+        <p:nvSpPr>
+          <p:cNvPr id="3" name="Content Placeholder 2"/>
+          <p:cNvSpPr>
+            <a:spLocks noGrp="1"/>
+          </p:cNvSpPr>
+          <p:nvPr>
+            <p:ph idx="1"/>
+          </p:nvPr>
+        </p:nvSpPr>
+        <p:spPr>
+          <a:xfrm>
+            <a:off x="457200" y="1600200"/>
+            <a:ext cx="8229600" cy="4944291"/>
+          </a:xfrm>
+        </p:spPr>
+        <p:txBody>
+          <a:bodyPr>
+            <a:normAutofit fontScale="85000" lnSpcReduction="10000"/>
+          </a:bodyPr>
+          <a:lstStyle/>
+          <a:p>
+            <a:r>
+              <a:rPr lang="en-US" dirty="0" smtClean="0"/>
+              <a:t>Anytime the shell sees a string containing an asterisk (*) it is replaced with a list of matching file names.</a:t>
+            </a:r>
+          </a:p>
+          <a:p>
+            <a:endParaRPr lang="en-US" dirty="0" smtClean="0"/>
+          </a:p>
+          <a:p>
+            <a:pPr marL="0" indent="0">
+              <a:buNone/>
+            </a:pPr>
+            <a:r>
+              <a:rPr lang="en-US" dirty="0" smtClean="0"/>
+              <a:t>	</a:t>
+            </a:r>
+            <a:r>
+              <a:rPr lang="en-US" dirty="0" smtClean="0">
+                <a:latin typeface="Consolas" charset="0"/>
+                <a:ea typeface="Consolas" charset="0"/>
+                <a:cs typeface="Consolas" charset="0"/>
+              </a:rPr>
+              <a:t>echo *.jpg	</a:t>
+            </a:r>
+            <a:r>
+              <a:rPr lang="en-US" dirty="0" smtClean="0"/>
+              <a:t>	# list all jpeg files</a:t>
+            </a:r>
+          </a:p>
+          <a:p>
+            <a:endParaRPr lang="en-US" dirty="0" smtClean="0"/>
+          </a:p>
+          <a:p>
+            <a:r>
+              <a:rPr lang="en-US" dirty="0" smtClean="0"/>
+              <a:t>We can use this </a:t>
+            </a:r>
+            <a:r>
+              <a:rPr lang="en-US" dirty="0" err="1" smtClean="0"/>
+              <a:t>globbing</a:t>
+            </a:r>
+            <a:r>
+              <a:rPr lang="en-US" dirty="0" smtClean="0"/>
+              <a:t> action to our advantage:</a:t>
+            </a:r>
+          </a:p>
+          <a:p>
+            <a:pPr marL="0" indent="0">
+              <a:buNone/>
+            </a:pPr>
+            <a:r>
+              <a:rPr lang="en-US" dirty="0" smtClean="0">
+                <a:latin typeface="Consolas" charset="0"/>
+                <a:ea typeface="Consolas" charset="0"/>
+                <a:cs typeface="Consolas" charset="0"/>
+              </a:rPr>
+              <a:t>	#!/bin/bash</a:t>
+            </a:r>
+          </a:p>
+          <a:p>
+            <a:pPr marL="400050" lvl="1" indent="0">
+              <a:buNone/>
+            </a:pPr>
+            <a:r>
+              <a:rPr lang="en-US" dirty="0" smtClean="0">
+                <a:latin typeface="Consolas" charset="0"/>
+                <a:ea typeface="Consolas" charset="0"/>
+                <a:cs typeface="Consolas" charset="0"/>
+              </a:rPr>
+              <a:t>for X in *.jpg</a:t>
+            </a:r>
+          </a:p>
+          <a:p>
+            <a:pPr marL="400050" lvl="1" indent="0">
+              <a:buNone/>
+            </a:pPr>
+            <a:r>
+              <a:rPr lang="en-US" dirty="0">
+                <a:latin typeface="Consolas" charset="0"/>
+                <a:ea typeface="Consolas" charset="0"/>
+                <a:cs typeface="Consolas" charset="0"/>
+              </a:rPr>
+              <a:t>d</a:t>
+            </a:r>
+            <a:r>
+              <a:rPr lang="en-US" dirty="0" smtClean="0">
+                <a:latin typeface="Consolas" charset="0"/>
+                <a:ea typeface="Consolas" charset="0"/>
+                <a:cs typeface="Consolas" charset="0"/>
+              </a:rPr>
+              <a:t>o</a:t>
+            </a:r>
+          </a:p>
+          <a:p>
+            <a:pPr marL="857250" lvl="2" indent="0">
+              <a:buNone/>
+            </a:pPr>
+            <a:r>
+              <a:rPr lang="en-US" dirty="0" err="1">
+                <a:latin typeface="Consolas" charset="0"/>
+                <a:ea typeface="Consolas" charset="0"/>
+                <a:cs typeface="Consolas" charset="0"/>
+              </a:rPr>
+              <a:t>c</a:t>
+            </a:r>
+            <a:r>
+              <a:rPr lang="en-US" dirty="0" err="1" smtClean="0">
+                <a:latin typeface="Consolas" charset="0"/>
+                <a:ea typeface="Consolas" charset="0"/>
+                <a:cs typeface="Consolas" charset="0"/>
+              </a:rPr>
+              <a:t>p</a:t>
+            </a:r>
+            <a:r>
+              <a:rPr lang="en-US" dirty="0" smtClean="0">
+                <a:latin typeface="Consolas" charset="0"/>
+                <a:ea typeface="Consolas" charset="0"/>
+                <a:cs typeface="Consolas" charset="0"/>
+              </a:rPr>
+              <a:t> $X $</a:t>
+            </a:r>
+            <a:r>
+              <a:rPr lang="en-US" dirty="0" err="1" smtClean="0">
+                <a:latin typeface="Consolas" charset="0"/>
+                <a:ea typeface="Consolas" charset="0"/>
+                <a:cs typeface="Consolas" charset="0"/>
+              </a:rPr>
+              <a:t>X.bak</a:t>
+            </a:r>
+            <a:r>
+              <a:rPr lang="en-US" dirty="0" smtClean="0">
+                <a:latin typeface="Consolas" charset="0"/>
+                <a:ea typeface="Consolas" charset="0"/>
+                <a:cs typeface="Consolas" charset="0"/>
+              </a:rPr>
+              <a:t>  </a:t>
+            </a:r>
+            <a:r>
+              <a:rPr lang="en-US" dirty="0">
+                <a:latin typeface="Consolas" charset="0"/>
+                <a:ea typeface="Consolas" charset="0"/>
+                <a:cs typeface="Consolas" charset="0"/>
+              </a:rPr>
+              <a:t>	# Backup all the jpeg </a:t>
+            </a:r>
+            <a:r>
+              <a:rPr lang="en-US" dirty="0" smtClean="0">
+                <a:latin typeface="Consolas" charset="0"/>
+                <a:ea typeface="Consolas" charset="0"/>
+                <a:cs typeface="Consolas" charset="0"/>
+              </a:rPr>
+              <a:t>files</a:t>
+            </a:r>
+          </a:p>
+          <a:p>
+            <a:pPr marL="400050" lvl="1" indent="0">
+              <a:buNone/>
+            </a:pPr>
+            <a:r>
+              <a:rPr lang="en-US" dirty="0" smtClean="0">
+                <a:latin typeface="Consolas" charset="0"/>
+                <a:ea typeface="Consolas" charset="0"/>
+                <a:cs typeface="Consolas" charset="0"/>
+              </a:rPr>
+              <a:t>done</a:t>
+            </a:r>
+            <a:endParaRPr lang="en-US" dirty="0">
+              <a:latin typeface="Consolas" charset="0"/>
+              <a:ea typeface="Consolas" charset="0"/>
+              <a:cs typeface="Consolas" charset="0"/>
+            </a:endParaRPr>
+          </a:p>
+        </p:txBody>
+      </p:sp>
+    </p:spTree>
+    <p:extLst>
+      <p:ext uri="{BB962C8B-B14F-4D97-AF65-F5344CB8AC3E}">
+        <p14:creationId xmlns:p14="http://schemas.microsoft.com/office/powerpoint/2010/main" val="1948275575"/>
+      </p:ext>
+    </p:extLst>
+  </p:cSld>
+  <p:clrMapOvr>
+    <a:masterClrMapping/>
+  </p:clrMapOvr>
+</p:sld>
+</file>
+
+<file path=ppt/slides/slide18.xml><?xml version="1.0" encoding="utf-8"?>
+<p:sld xmlns:a="http://schemas.openxmlformats.org/drawingml/2006/main" xmlns:r="http://schemas.openxmlformats.org/officeDocument/2006/relationships" xmlns:p="http://schemas.openxmlformats.org/presentationml/2006/main">
+  <p:cSld>
+    <p:spTree>
+      <p:nvGrpSpPr>
+        <p:cNvPr id="1" name=""/>
+        <p:cNvGrpSpPr/>
+        <p:nvPr/>
+      </p:nvGrpSpPr>
+      <p:grpSpPr>
+        <a:xfrm>
+          <a:off x="0" y="0"/>
+          <a:ext cx="0" cy="0"/>
+          <a:chOff x="0" y="0"/>
+          <a:chExt cx="0" cy="0"/>
+        </a:xfrm>
+      </p:grpSpPr>
+      <p:sp>
+        <p:nvSpPr>
+          <p:cNvPr id="2" name="Title 1"/>
+          <p:cNvSpPr>
+            <a:spLocks noGrp="1"/>
+          </p:cNvSpPr>
+          <p:nvPr>
+            <p:ph type="title"/>
+          </p:nvPr>
+        </p:nvSpPr>
+        <p:spPr/>
+        <p:txBody>
+          <a:bodyPr/>
+          <a:lstStyle/>
+          <a:p>
+            <a:r>
+              <a:rPr lang="en-US" dirty="0" smtClean="0"/>
+              <a:t>Shell command substitution</a:t>
+            </a:r>
+            <a:endParaRPr lang="en-US" dirty="0"/>
+          </a:p>
+        </p:txBody>
+      </p:sp>
+      <p:sp>
+        <p:nvSpPr>
+          <p:cNvPr id="3" name="Content Placeholder 2"/>
+          <p:cNvSpPr>
+            <a:spLocks noGrp="1"/>
+          </p:cNvSpPr>
+          <p:nvPr>
+            <p:ph idx="1"/>
+          </p:nvPr>
+        </p:nvSpPr>
+        <p:spPr>
+          <a:xfrm>
+            <a:off x="457200" y="1600200"/>
+            <a:ext cx="8229600" cy="5153297"/>
+          </a:xfrm>
+        </p:spPr>
+        <p:txBody>
+          <a:bodyPr>
+            <a:normAutofit fontScale="62500" lnSpcReduction="20000"/>
+          </a:bodyPr>
+          <a:lstStyle/>
+          <a:p>
+            <a:r>
+              <a:rPr lang="en-US" dirty="0" smtClean="0"/>
+              <a:t>Command substitution takes the output of a command and uses it as if it is a statement.</a:t>
+            </a:r>
+          </a:p>
+          <a:p>
+            <a:pPr lvl="1"/>
+            <a:r>
+              <a:rPr lang="en-US" dirty="0" smtClean="0"/>
+              <a:t>Two methods: parenthesis or </a:t>
+            </a:r>
+            <a:r>
+              <a:rPr lang="en-US" dirty="0" err="1" smtClean="0"/>
+              <a:t>backtick</a:t>
+            </a:r>
+            <a:endParaRPr lang="en-US" dirty="0" smtClean="0"/>
+          </a:p>
+          <a:p>
+            <a:pPr lvl="1"/>
+            <a:endParaRPr lang="en-US" dirty="0" smtClean="0"/>
+          </a:p>
+          <a:p>
+            <a:pPr marL="457200" lvl="1" indent="0">
+              <a:buNone/>
+            </a:pPr>
+            <a:r>
+              <a:rPr lang="en-US" dirty="0" smtClean="0">
+                <a:latin typeface="Consolas" charset="0"/>
+                <a:ea typeface="Consolas" charset="0"/>
+                <a:cs typeface="Consolas" charset="0"/>
+              </a:rPr>
+              <a:t>#!/bin/bash</a:t>
+            </a:r>
+          </a:p>
+          <a:p>
+            <a:pPr marL="457200" lvl="1" indent="0">
+              <a:buNone/>
+            </a:pPr>
+            <a:r>
+              <a:rPr lang="en-US" dirty="0" smtClean="0">
+                <a:latin typeface="Consolas" charset="0"/>
+                <a:ea typeface="Consolas" charset="0"/>
+                <a:cs typeface="Consolas" charset="0"/>
+              </a:rPr>
+              <a:t>FILES=“$(ls)”</a:t>
+            </a:r>
+          </a:p>
+          <a:p>
+            <a:pPr marL="457200" lvl="1" indent="0">
+              <a:buNone/>
+            </a:pPr>
+            <a:r>
+              <a:rPr lang="en-US" dirty="0" smtClean="0">
+                <a:latin typeface="Consolas" charset="0"/>
+                <a:ea typeface="Consolas" charset="0"/>
+                <a:cs typeface="Consolas" charset="0"/>
+              </a:rPr>
+              <a:t>WEB_FILES=`ls /</a:t>
+            </a:r>
+            <a:r>
+              <a:rPr lang="en-US" dirty="0" err="1" smtClean="0">
+                <a:latin typeface="Consolas" charset="0"/>
+                <a:ea typeface="Consolas" charset="0"/>
+                <a:cs typeface="Consolas" charset="0"/>
+              </a:rPr>
+              <a:t>var</a:t>
+            </a:r>
+            <a:r>
+              <a:rPr lang="en-US" dirty="0" smtClean="0">
+                <a:latin typeface="Consolas" charset="0"/>
+                <a:ea typeface="Consolas" charset="0"/>
+                <a:cs typeface="Consolas" charset="0"/>
+              </a:rPr>
+              <a:t>/www/html`</a:t>
+            </a:r>
+          </a:p>
+          <a:p>
+            <a:pPr marL="457200" lvl="1" indent="0">
+              <a:buNone/>
+            </a:pPr>
+            <a:r>
+              <a:rPr lang="en-US" dirty="0">
+                <a:latin typeface="Consolas" charset="0"/>
+                <a:ea typeface="Consolas" charset="0"/>
+                <a:cs typeface="Consolas" charset="0"/>
+              </a:rPr>
+              <a:t>e</a:t>
+            </a:r>
+            <a:r>
+              <a:rPr lang="en-US" dirty="0" smtClean="0">
+                <a:latin typeface="Consolas" charset="0"/>
+                <a:ea typeface="Consolas" charset="0"/>
+                <a:cs typeface="Consolas" charset="0"/>
+              </a:rPr>
+              <a:t>cho $FILES</a:t>
+            </a:r>
+          </a:p>
+          <a:p>
+            <a:pPr marL="457200" lvl="1" indent="0">
+              <a:buNone/>
+            </a:pPr>
+            <a:r>
+              <a:rPr lang="en-US" dirty="0">
+                <a:latin typeface="Consolas" charset="0"/>
+                <a:ea typeface="Consolas" charset="0"/>
+                <a:cs typeface="Consolas" charset="0"/>
+              </a:rPr>
+              <a:t>e</a:t>
+            </a:r>
+            <a:r>
+              <a:rPr lang="en-US" dirty="0" smtClean="0">
+                <a:latin typeface="Consolas" charset="0"/>
+                <a:ea typeface="Consolas" charset="0"/>
+                <a:cs typeface="Consolas" charset="0"/>
+              </a:rPr>
+              <a:t>cho $WEB_FILES</a:t>
+            </a:r>
+          </a:p>
+          <a:p>
+            <a:pPr marL="457200" lvl="1" indent="0">
+              <a:buNone/>
+            </a:pPr>
+            <a:endParaRPr lang="en-US" dirty="0" smtClean="0">
+              <a:latin typeface="Consolas" charset="0"/>
+              <a:ea typeface="Consolas" charset="0"/>
+              <a:cs typeface="Consolas" charset="0"/>
+            </a:endParaRPr>
+          </a:p>
+          <a:p>
+            <a:r>
+              <a:rPr lang="en-US" dirty="0" smtClean="0">
+                <a:latin typeface="Consolas" charset="0"/>
+                <a:ea typeface="Consolas" charset="0"/>
+                <a:cs typeface="Consolas" charset="0"/>
+              </a:rPr>
+              <a:t>Setting a variable to the output from a loop:</a:t>
+            </a:r>
+          </a:p>
+          <a:p>
+            <a:endParaRPr lang="en-US" dirty="0" smtClean="0">
+              <a:latin typeface="Consolas" charset="0"/>
+              <a:ea typeface="Consolas" charset="0"/>
+              <a:cs typeface="Consolas" charset="0"/>
+            </a:endParaRPr>
+          </a:p>
+          <a:p>
+            <a:pPr marL="400050" lvl="1" indent="0">
+              <a:buNone/>
+            </a:pPr>
+            <a:r>
+              <a:rPr lang="en-US" dirty="0" smtClean="0">
+                <a:latin typeface="Consolas" charset="0"/>
+                <a:ea typeface="Consolas" charset="0"/>
+                <a:cs typeface="Consolas" charset="0"/>
+              </a:rPr>
+              <a:t>#!/bin/bash</a:t>
+            </a:r>
+          </a:p>
+          <a:p>
+            <a:pPr marL="400050" lvl="1" indent="0">
+              <a:buNone/>
+            </a:pPr>
+            <a:r>
+              <a:rPr lang="en-US" dirty="0" smtClean="0">
+                <a:latin typeface="Consolas" charset="0"/>
+                <a:ea typeface="Consolas" charset="0"/>
+                <a:cs typeface="Consolas" charset="0"/>
+              </a:rPr>
+              <a:t># var1 = 1234</a:t>
+            </a:r>
+          </a:p>
+          <a:p>
+            <a:pPr marL="400050" lvl="1" indent="0">
+              <a:buNone/>
+            </a:pPr>
+            <a:r>
+              <a:rPr lang="en-US" dirty="0">
+                <a:latin typeface="Consolas" charset="0"/>
+                <a:ea typeface="Consolas" charset="0"/>
+                <a:cs typeface="Consolas" charset="0"/>
+              </a:rPr>
+              <a:t>v</a:t>
+            </a:r>
+            <a:r>
+              <a:rPr lang="en-US" dirty="0" smtClean="0">
+                <a:latin typeface="Consolas" charset="0"/>
+                <a:ea typeface="Consolas" charset="0"/>
+                <a:cs typeface="Consolas" charset="0"/>
+              </a:rPr>
+              <a:t>ar1=`for x in 1 2 3 4</a:t>
+            </a:r>
+          </a:p>
+          <a:p>
+            <a:pPr marL="400050" lvl="1" indent="0">
+              <a:buNone/>
+            </a:pPr>
+            <a:r>
+              <a:rPr lang="en-US" dirty="0">
+                <a:latin typeface="Consolas" charset="0"/>
+                <a:ea typeface="Consolas" charset="0"/>
+                <a:cs typeface="Consolas" charset="0"/>
+              </a:rPr>
+              <a:t>d</a:t>
+            </a:r>
+            <a:r>
+              <a:rPr lang="en-US" dirty="0" smtClean="0">
+                <a:latin typeface="Consolas" charset="0"/>
+                <a:ea typeface="Consolas" charset="0"/>
+                <a:cs typeface="Consolas" charset="0"/>
+              </a:rPr>
+              <a:t>o</a:t>
+            </a:r>
+          </a:p>
+          <a:p>
+            <a:pPr marL="857250" lvl="2" indent="0">
+              <a:buNone/>
+            </a:pPr>
+            <a:r>
+              <a:rPr lang="en-US" dirty="0">
+                <a:latin typeface="Consolas" charset="0"/>
+                <a:ea typeface="Consolas" charset="0"/>
+                <a:cs typeface="Consolas" charset="0"/>
+              </a:rPr>
+              <a:t>e</a:t>
+            </a:r>
+            <a:r>
+              <a:rPr lang="en-US" dirty="0" smtClean="0">
+                <a:latin typeface="Consolas" charset="0"/>
+                <a:ea typeface="Consolas" charset="0"/>
+                <a:cs typeface="Consolas" charset="0"/>
+              </a:rPr>
+              <a:t>cho –n “$x”</a:t>
+            </a:r>
+          </a:p>
+          <a:p>
+            <a:pPr marL="400050" lvl="1" indent="0">
+              <a:buNone/>
+            </a:pPr>
+            <a:r>
+              <a:rPr lang="en-US" dirty="0">
+                <a:latin typeface="Consolas" charset="0"/>
+                <a:ea typeface="Consolas" charset="0"/>
+                <a:cs typeface="Consolas" charset="0"/>
+              </a:rPr>
+              <a:t>d</a:t>
+            </a:r>
+            <a:r>
+              <a:rPr lang="en-US" dirty="0" smtClean="0">
+                <a:latin typeface="Consolas" charset="0"/>
+                <a:ea typeface="Consolas" charset="0"/>
+                <a:cs typeface="Consolas" charset="0"/>
+              </a:rPr>
+              <a:t>one`</a:t>
+            </a:r>
+            <a:endParaRPr lang="en-US" dirty="0">
+              <a:latin typeface="Consolas" charset="0"/>
+              <a:ea typeface="Consolas" charset="0"/>
+              <a:cs typeface="Consolas" charset="0"/>
+            </a:endParaRPr>
+          </a:p>
+        </p:txBody>
+      </p:sp>
+    </p:spTree>
+    <p:extLst>
+      <p:ext uri="{BB962C8B-B14F-4D97-AF65-F5344CB8AC3E}">
+        <p14:creationId xmlns:p14="http://schemas.microsoft.com/office/powerpoint/2010/main" val="1359289208"/>
+      </p:ext>
+    </p:extLst>
+  </p:cSld>
+  <p:clrMapOvr>
+    <a:masterClrMapping/>
+  </p:clrMapOvr>
+</p:sld>
+</file>
+
+<file path=ppt/slides/slide19.xml><?xml version="1.0" encoding="utf-8"?>
+<p:sld xmlns:a="http://schemas.openxmlformats.org/drawingml/2006/main" xmlns:r="http://schemas.openxmlformats.org/officeDocument/2006/relationships" xmlns:p="http://schemas.openxmlformats.org/presentationml/2006/main">
+  <p:cSld>
+    <p:spTree>
+      <p:nvGrpSpPr>
+        <p:cNvPr id="1" name=""/>
+        <p:cNvGrpSpPr/>
+        <p:nvPr/>
+      </p:nvGrpSpPr>
+      <p:grpSpPr>
+        <a:xfrm>
+          <a:off x="0" y="0"/>
+          <a:ext cx="0" cy="0"/>
+          <a:chOff x="0" y="0"/>
+          <a:chExt cx="0" cy="0"/>
+        </a:xfrm>
+      </p:grpSpPr>
+      <p:sp>
+        <p:nvSpPr>
+          <p:cNvPr id="2" name="Title 1"/>
+          <p:cNvSpPr>
+            <a:spLocks noGrp="1"/>
+          </p:cNvSpPr>
+          <p:nvPr>
+            <p:ph type="title"/>
+          </p:nvPr>
+        </p:nvSpPr>
+        <p:spPr/>
+        <p:txBody>
+          <a:bodyPr/>
+          <a:lstStyle/>
+          <a:p>
+            <a:r>
+              <a:rPr lang="en-US" dirty="0" smtClean="0"/>
+              <a:t>Shell parameter substitution</a:t>
+            </a:r>
+            <a:endParaRPr lang="en-US" dirty="0"/>
+          </a:p>
+        </p:txBody>
+      </p:sp>
+      <p:sp>
+        <p:nvSpPr>
+          <p:cNvPr id="3" name="Content Placeholder 2"/>
+          <p:cNvSpPr>
+            <a:spLocks noGrp="1"/>
+          </p:cNvSpPr>
+          <p:nvPr>
+            <p:ph idx="1"/>
+          </p:nvPr>
+        </p:nvSpPr>
+        <p:spPr/>
+        <p:txBody>
+          <a:bodyPr>
+            <a:normAutofit fontScale="70000" lnSpcReduction="20000"/>
+          </a:bodyPr>
+          <a:lstStyle/>
+          <a:p>
+            <a:r>
+              <a:rPr lang="en-US" dirty="0" smtClean="0"/>
+              <a:t>Parameter substitution is used to manipulate variable values</a:t>
+            </a:r>
+          </a:p>
+          <a:p>
+            <a:pPr lvl="1"/>
+            <a:r>
+              <a:rPr lang="en-US" dirty="0" smtClean="0"/>
+              <a:t>Uses braces {} to enclose variable construct</a:t>
+            </a:r>
+          </a:p>
+          <a:p>
+            <a:pPr lvl="1"/>
+            <a:endParaRPr lang="en-US" dirty="0" smtClean="0">
+              <a:latin typeface="Consolas" charset="0"/>
+              <a:ea typeface="Consolas" charset="0"/>
+              <a:cs typeface="Consolas" charset="0"/>
+            </a:endParaRPr>
+          </a:p>
+          <a:p>
+            <a:pPr marL="400050" lvl="1" indent="0">
+              <a:buNone/>
+            </a:pPr>
+            <a:r>
+              <a:rPr lang="en-US" dirty="0" smtClean="0">
+                <a:latin typeface="Consolas" charset="0"/>
+                <a:ea typeface="Consolas" charset="0"/>
+                <a:cs typeface="Consolas" charset="0"/>
+              </a:rPr>
+              <a:t>#!/bin/bash</a:t>
+            </a:r>
+          </a:p>
+          <a:p>
+            <a:pPr marL="400050" lvl="1" indent="0">
+              <a:buNone/>
+            </a:pPr>
+            <a:r>
+              <a:rPr lang="en-US" dirty="0">
+                <a:latin typeface="Consolas" charset="0"/>
+                <a:ea typeface="Consolas" charset="0"/>
+                <a:cs typeface="Consolas" charset="0"/>
+              </a:rPr>
+              <a:t>v</a:t>
+            </a:r>
+            <a:r>
+              <a:rPr lang="en-US" dirty="0" smtClean="0">
+                <a:latin typeface="Consolas" charset="0"/>
+                <a:ea typeface="Consolas" charset="0"/>
+                <a:cs typeface="Consolas" charset="0"/>
+              </a:rPr>
+              <a:t>ar1=1</a:t>
+            </a:r>
+          </a:p>
+          <a:p>
+            <a:pPr marL="400050" lvl="1" indent="0">
+              <a:buNone/>
+            </a:pPr>
+            <a:r>
+              <a:rPr lang="en-US" dirty="0">
+                <a:latin typeface="Consolas" charset="0"/>
+                <a:ea typeface="Consolas" charset="0"/>
+                <a:cs typeface="Consolas" charset="0"/>
+              </a:rPr>
+              <a:t>v</a:t>
+            </a:r>
+            <a:r>
+              <a:rPr lang="en-US" dirty="0" smtClean="0">
+                <a:latin typeface="Consolas" charset="0"/>
+                <a:ea typeface="Consolas" charset="0"/>
+                <a:cs typeface="Consolas" charset="0"/>
+              </a:rPr>
+              <a:t>ar2=2</a:t>
+            </a:r>
+          </a:p>
+          <a:p>
+            <a:pPr marL="400050" lvl="1" indent="0">
+              <a:buNone/>
+            </a:pPr>
+            <a:r>
+              <a:rPr lang="en-US" dirty="0">
+                <a:latin typeface="Consolas" charset="0"/>
+                <a:ea typeface="Consolas" charset="0"/>
+                <a:cs typeface="Consolas" charset="0"/>
+              </a:rPr>
+              <a:t>e</a:t>
+            </a:r>
+            <a:r>
+              <a:rPr lang="en-US" dirty="0" smtClean="0">
+                <a:latin typeface="Consolas" charset="0"/>
+                <a:ea typeface="Consolas" charset="0"/>
+                <a:cs typeface="Consolas" charset="0"/>
+              </a:rPr>
+              <a:t>cho $(var1-$var2}		# output is 1</a:t>
+            </a:r>
+          </a:p>
+          <a:p>
+            <a:pPr marL="0" indent="0">
+              <a:buNone/>
+            </a:pPr>
+            <a:endParaRPr lang="en-US" dirty="0" smtClean="0"/>
+          </a:p>
+          <a:p>
+            <a:r>
+              <a:rPr lang="en-US" dirty="0" smtClean="0"/>
+              <a:t>Useful for assigning a default value to a variable using the :- characters</a:t>
+            </a:r>
+          </a:p>
+          <a:p>
+            <a:endParaRPr lang="en-US" dirty="0" smtClean="0"/>
+          </a:p>
+          <a:p>
+            <a:pPr marL="400050" lvl="1" indent="0">
+              <a:buNone/>
+            </a:pPr>
+            <a:r>
+              <a:rPr lang="en-US" dirty="0" smtClean="0">
+                <a:latin typeface="Consolas" charset="0"/>
+                <a:ea typeface="Consolas" charset="0"/>
+                <a:cs typeface="Consolas" charset="0"/>
+              </a:rPr>
+              <a:t>#!/bin/bash</a:t>
+            </a:r>
+          </a:p>
+          <a:p>
+            <a:pPr marL="400050" lvl="1" indent="0">
+              <a:buNone/>
+            </a:pPr>
+            <a:r>
+              <a:rPr lang="en-US" dirty="0" smtClean="0">
+                <a:latin typeface="Consolas" charset="0"/>
+                <a:ea typeface="Consolas" charset="0"/>
+                <a:cs typeface="Consolas" charset="0"/>
+              </a:rPr>
+              <a:t>echo “Name is ${name:-Sam}”	# name defaults to Sam</a:t>
+            </a:r>
+          </a:p>
+          <a:p>
+            <a:pPr marL="400050" lvl="1" indent="0">
+              <a:buNone/>
+            </a:pPr>
+            <a:r>
+              <a:rPr lang="en-US" dirty="0" smtClean="0">
+                <a:latin typeface="Consolas" charset="0"/>
+                <a:ea typeface="Consolas" charset="0"/>
+                <a:cs typeface="Consolas" charset="0"/>
+              </a:rPr>
+              <a:t>exit 0</a:t>
+            </a:r>
+          </a:p>
+        </p:txBody>
+      </p:sp>
+    </p:spTree>
+    <p:extLst>
+      <p:ext uri="{BB962C8B-B14F-4D97-AF65-F5344CB8AC3E}">
+        <p14:creationId xmlns:p14="http://schemas.microsoft.com/office/powerpoint/2010/main" val="1829340094"/>
+      </p:ext>
+    </p:extLst>
+  </p:cSld>
+  <p:clrMapOvr>
+    <a:masterClrMapping/>
+  </p:clrMapOvr>
+</p:sld>
+</file>
+
+<file path=ppt/slides/slide2.xml><?xml version="1.0" encoding="utf-8"?>
+<p:sld xmlns:a="http://schemas.openxmlformats.org/drawingml/2006/main" xmlns:r="http://schemas.openxmlformats.org/officeDocument/2006/relationships" xmlns:p="http://schemas.openxmlformats.org/presentationml/2006/main">
+  <p:cSld>
+    <p:spTree>
+      <p:nvGrpSpPr>
+        <p:cNvPr id="1" name=""/>
+        <p:cNvGrpSpPr/>
+        <p:nvPr/>
+      </p:nvGrpSpPr>
+      <p:grpSpPr>
+        <a:xfrm>
+          <a:off x="0" y="0"/>
+          <a:ext cx="0" cy="0"/>
+          <a:chOff x="0" y="0"/>
+          <a:chExt cx="0" cy="0"/>
+        </a:xfrm>
+      </p:grpSpPr>
+      <p:sp>
+        <p:nvSpPr>
+          <p:cNvPr id="2" name="Title 1"/>
+          <p:cNvSpPr>
+            <a:spLocks noGrp="1"/>
+          </p:cNvSpPr>
+          <p:nvPr>
+            <p:ph type="title"/>
+          </p:nvPr>
+        </p:nvSpPr>
+        <p:spPr/>
+        <p:txBody>
+          <a:bodyPr/>
+          <a:lstStyle/>
+          <a:p>
+            <a:r>
+              <a:rPr lang="en-US" smtClean="0"/>
+              <a:t>Agenda</a:t>
+            </a:r>
+            <a:endParaRPr lang="en-US" dirty="0"/>
+          </a:p>
+        </p:txBody>
+      </p:sp>
+      <p:sp>
+        <p:nvSpPr>
+          <p:cNvPr id="3" name="Content Placeholder 2"/>
+          <p:cNvSpPr>
+            <a:spLocks noGrp="1"/>
+          </p:cNvSpPr>
+          <p:nvPr>
+            <p:ph idx="1"/>
+          </p:nvPr>
+        </p:nvSpPr>
+        <p:spPr/>
+        <p:txBody>
+          <a:bodyPr/>
+          <a:lstStyle/>
+          <a:p>
+            <a:r>
+              <a:rPr lang="en-US" dirty="0" smtClean="0"/>
+              <a:t>Review readings</a:t>
+            </a:r>
+          </a:p>
+          <a:p>
+            <a:r>
+              <a:rPr lang="en-US" dirty="0" smtClean="0"/>
+              <a:t>Linux fundamentals</a:t>
+            </a:r>
+            <a:endParaRPr lang="en-US" dirty="0"/>
+          </a:p>
+          <a:p>
+            <a:r>
+              <a:rPr lang="en-US" dirty="0" smtClean="0"/>
+              <a:t>Package management</a:t>
+            </a:r>
+          </a:p>
+          <a:p>
+            <a:r>
+              <a:rPr lang="en-US" dirty="0" smtClean="0"/>
+              <a:t>Shell scripting</a:t>
+            </a:r>
+          </a:p>
+          <a:p>
+            <a:endParaRPr lang="en-US" dirty="0" smtClean="0"/>
+          </a:p>
+        </p:txBody>
+      </p:sp>
+      <p:pic>
+        <p:nvPicPr>
+          <p:cNvPr id="4" name="Picture 3"/>
+          <p:cNvPicPr>
+            <a:picLocks noChangeAspect="1"/>
+          </p:cNvPicPr>
+          <p:nvPr/>
+        </p:nvPicPr>
+        <p:blipFill>
+          <a:blip r:embed="rId2"/>
+          <a:stretch>
+            <a:fillRect/>
+          </a:stretch>
+        </p:blipFill>
+        <p:spPr>
+          <a:xfrm>
+            <a:off x="5791282" y="1600200"/>
+            <a:ext cx="2641600" cy="3073400"/>
+          </a:xfrm>
+          <a:prstGeom prst="rect">
+            <a:avLst/>
+          </a:prstGeom>
+        </p:spPr>
+      </p:pic>
+    </p:spTree>
+    <p:extLst>
+      <p:ext uri="{BB962C8B-B14F-4D97-AF65-F5344CB8AC3E}">
+        <p14:creationId xmlns:p14="http://schemas.microsoft.com/office/powerpoint/2010/main" val="3024628326"/>
+      </p:ext>
+    </p:extLst>
+  </p:cSld>
+  <p:clrMapOvr>
+    <a:masterClrMapping/>
+  </p:clrMapOvr>
+</p:sld>
+</file>
+
+<file path=ppt/slides/slide20.xml><?xml version="1.0" encoding="utf-8"?>
+<p:sld xmlns:a="http://schemas.openxmlformats.org/drawingml/2006/main" xmlns:r="http://schemas.openxmlformats.org/officeDocument/2006/relationships" xmlns:p="http://schemas.openxmlformats.org/presentationml/2006/main">
+  <p:cSld>
+    <p:spTree>
+      <p:nvGrpSpPr>
+        <p:cNvPr id="1" name=""/>
+        <p:cNvGrpSpPr/>
+        <p:nvPr/>
+      </p:nvGrpSpPr>
+      <p:grpSpPr>
+        <a:xfrm>
+          <a:off x="0" y="0"/>
+          <a:ext cx="0" cy="0"/>
+          <a:chOff x="0" y="0"/>
+          <a:chExt cx="0" cy="0"/>
+        </a:xfrm>
+      </p:grpSpPr>
+      <p:sp>
+        <p:nvSpPr>
+          <p:cNvPr id="2" name="Title 1"/>
+          <p:cNvSpPr>
+            <a:spLocks noGrp="1"/>
+          </p:cNvSpPr>
+          <p:nvPr>
+            <p:ph type="title"/>
+          </p:nvPr>
+        </p:nvSpPr>
+        <p:spPr/>
+        <p:txBody>
+          <a:bodyPr>
+            <a:normAutofit/>
+          </a:bodyPr>
+          <a:lstStyle/>
+          <a:p>
+            <a:r>
+              <a:rPr lang="en-US" dirty="0" smtClean="0"/>
+              <a:t>Linux</a:t>
+            </a:r>
+            <a:endParaRPr lang="en-US" dirty="0"/>
+          </a:p>
+        </p:txBody>
+      </p:sp>
+      <p:sp>
+        <p:nvSpPr>
+          <p:cNvPr id="3" name="Content Placeholder 2"/>
+          <p:cNvSpPr>
+            <a:spLocks noGrp="1"/>
+          </p:cNvSpPr>
+          <p:nvPr>
+            <p:ph idx="1"/>
+          </p:nvPr>
+        </p:nvSpPr>
+        <p:spPr>
+          <a:xfrm>
+            <a:off x="457200" y="1600200"/>
+            <a:ext cx="8229600" cy="4895374"/>
+          </a:xfrm>
+        </p:spPr>
+        <p:txBody>
+          <a:bodyPr>
+            <a:normAutofit fontScale="92500" lnSpcReduction="10000"/>
+          </a:bodyPr>
+          <a:lstStyle/>
+          <a:p>
+            <a:r>
+              <a:rPr lang="en-US" dirty="0" smtClean="0"/>
+              <a:t>History</a:t>
+            </a:r>
+          </a:p>
+          <a:p>
+            <a:pPr lvl="1"/>
+            <a:r>
+              <a:rPr lang="en-US" dirty="0" smtClean="0"/>
+              <a:t>Started by Linus Torvalds in 1991</a:t>
+            </a:r>
+          </a:p>
+          <a:p>
+            <a:pPr lvl="1"/>
+            <a:r>
+              <a:rPr lang="en-US" dirty="0" smtClean="0"/>
+              <a:t>Inspired by Unix, developed at AT&amp;T in 1970s</a:t>
+            </a:r>
+          </a:p>
+          <a:p>
+            <a:pPr lvl="1"/>
+            <a:r>
+              <a:rPr lang="en-US" dirty="0" smtClean="0"/>
+              <a:t>Linux is not Unix, but uses same concepts</a:t>
+            </a:r>
+          </a:p>
+          <a:p>
+            <a:pPr lvl="1"/>
+            <a:r>
+              <a:rPr lang="en-US" dirty="0" smtClean="0"/>
+              <a:t>Open Source Software (General Public License)</a:t>
+            </a:r>
+          </a:p>
+          <a:p>
+            <a:pPr lvl="1"/>
+            <a:endParaRPr lang="en-US" dirty="0" smtClean="0"/>
+          </a:p>
+          <a:p>
+            <a:r>
+              <a:rPr lang="en-US" dirty="0" smtClean="0"/>
+              <a:t>Runs on cells phones to largest supercomputers</a:t>
+            </a:r>
+          </a:p>
+          <a:p>
+            <a:endParaRPr lang="en-US" dirty="0" smtClean="0"/>
+          </a:p>
+          <a:p>
+            <a:r>
+              <a:rPr lang="en-US" dirty="0" smtClean="0"/>
+              <a:t>Perfect for supporting service-based application architecture in the cloud</a:t>
+            </a:r>
+            <a:endParaRPr lang="en-US" dirty="0"/>
+          </a:p>
+        </p:txBody>
+      </p:sp>
+      <p:pic>
+        <p:nvPicPr>
+          <p:cNvPr id="4" name="Picture 3"/>
+          <p:cNvPicPr>
+            <a:picLocks noChangeAspect="1"/>
+          </p:cNvPicPr>
+          <p:nvPr/>
+        </p:nvPicPr>
+        <p:blipFill>
+          <a:blip r:embed="rId2"/>
+          <a:stretch>
+            <a:fillRect/>
+          </a:stretch>
+        </p:blipFill>
+        <p:spPr>
+          <a:xfrm>
+            <a:off x="6930759" y="432268"/>
+            <a:ext cx="1449139" cy="1686017"/>
+          </a:xfrm>
+          <a:prstGeom prst="rect">
+            <a:avLst/>
+          </a:prstGeom>
+        </p:spPr>
+      </p:pic>
+    </p:spTree>
+    <p:extLst>
+      <p:ext uri="{BB962C8B-B14F-4D97-AF65-F5344CB8AC3E}">
+        <p14:creationId xmlns:p14="http://schemas.microsoft.com/office/powerpoint/2010/main" val="3312454313"/>
+      </p:ext>
+    </p:extLst>
+  </p:cSld>
+  <p:clrMapOvr>
+    <a:masterClrMapping/>
+  </p:clrMapOvr>
+</p:sld>
+</file>
+
+<file path=ppt/slides/slide21.xml><?xml version="1.0" encoding="utf-8"?>
+<p:sld xmlns:a="http://schemas.openxmlformats.org/drawingml/2006/main" xmlns:r="http://schemas.openxmlformats.org/officeDocument/2006/relationships" xmlns:p="http://schemas.openxmlformats.org/presentationml/2006/main">
+  <p:cSld>
+    <p:spTree>
+      <p:nvGrpSpPr>
+        <p:cNvPr id="1" name=""/>
+        <p:cNvGrpSpPr/>
+        <p:nvPr/>
+      </p:nvGrpSpPr>
+      <p:grpSpPr>
+        <a:xfrm>
+          <a:off x="0" y="0"/>
+          <a:ext cx="0" cy="0"/>
+          <a:chOff x="0" y="0"/>
+          <a:chExt cx="0" cy="0"/>
+        </a:xfrm>
+      </p:grpSpPr>
+      <p:sp>
+        <p:nvSpPr>
+          <p:cNvPr id="2" name="Title 1"/>
+          <p:cNvSpPr>
+            <a:spLocks noGrp="1"/>
+          </p:cNvSpPr>
+          <p:nvPr>
+            <p:ph type="title"/>
+          </p:nvPr>
+        </p:nvSpPr>
+        <p:spPr/>
+        <p:txBody>
+          <a:bodyPr/>
+          <a:lstStyle/>
+          <a:p>
+            <a:r>
+              <a:rPr lang="en-US" dirty="0" smtClean="0"/>
+              <a:t>Linux</a:t>
+            </a:r>
+            <a:endParaRPr lang="en-US" dirty="0"/>
+          </a:p>
+        </p:txBody>
+      </p:sp>
+      <p:sp>
+        <p:nvSpPr>
+          <p:cNvPr id="3" name="Content Placeholder 2"/>
+          <p:cNvSpPr>
+            <a:spLocks noGrp="1"/>
+          </p:cNvSpPr>
+          <p:nvPr>
+            <p:ph idx="1"/>
+          </p:nvPr>
+        </p:nvSpPr>
+        <p:spPr/>
+        <p:txBody>
+          <a:bodyPr>
+            <a:normAutofit fontScale="92500"/>
+          </a:bodyPr>
+          <a:lstStyle/>
+          <a:p>
+            <a:r>
+              <a:rPr lang="en-US" dirty="0" smtClean="0"/>
+              <a:t>Why Linux? </a:t>
+            </a:r>
+          </a:p>
+          <a:p>
+            <a:pPr lvl="1"/>
+            <a:r>
+              <a:rPr lang="en-US" dirty="0"/>
+              <a:t>C</a:t>
+            </a:r>
+            <a:r>
+              <a:rPr lang="en-US" dirty="0" smtClean="0"/>
+              <a:t>ommon platform for modern distributed applications</a:t>
+            </a:r>
+          </a:p>
+          <a:p>
+            <a:pPr lvl="1"/>
+            <a:r>
+              <a:rPr lang="en-US" dirty="0" smtClean="0"/>
+              <a:t>Automation starts at the command line, not the GUI</a:t>
+            </a:r>
+          </a:p>
+          <a:p>
+            <a:pPr lvl="1"/>
+            <a:endParaRPr lang="en-US" dirty="0" smtClean="0"/>
+          </a:p>
+          <a:p>
+            <a:r>
+              <a:rPr lang="en-US" dirty="0" smtClean="0"/>
+              <a:t>Caveat: It’s not possible to learn Linux in a few hours. </a:t>
+            </a:r>
+          </a:p>
+          <a:p>
+            <a:pPr lvl="1"/>
+            <a:r>
+              <a:rPr lang="en-US" dirty="0" smtClean="0"/>
+              <a:t>Plan to invest meaningful time outside of class if you aren’t already familiar with it. </a:t>
+            </a:r>
+          </a:p>
+          <a:p>
+            <a:endParaRPr lang="en-US" dirty="0" smtClean="0"/>
+          </a:p>
+          <a:p>
+            <a:endParaRPr lang="en-US" dirty="0" smtClean="0"/>
+          </a:p>
+          <a:p>
+            <a:pPr lvl="1"/>
+            <a:endParaRPr lang="en-US" dirty="0" smtClean="0"/>
+          </a:p>
+        </p:txBody>
+      </p:sp>
+    </p:spTree>
+    <p:extLst>
+      <p:ext uri="{BB962C8B-B14F-4D97-AF65-F5344CB8AC3E}">
+        <p14:creationId xmlns:p14="http://schemas.microsoft.com/office/powerpoint/2010/main" val="3727470488"/>
+      </p:ext>
+    </p:extLst>
+  </p:cSld>
+  <p:clrMapOvr>
+    <a:masterClrMapping/>
+  </p:clrMapOvr>
+</p:sld>
+</file>
+
+<file path=ppt/slides/slide22.xml><?xml version="1.0" encoding="utf-8"?>
+<p:sld xmlns:a="http://schemas.openxmlformats.org/drawingml/2006/main" xmlns:r="http://schemas.openxmlformats.org/officeDocument/2006/relationships" xmlns:p="http://schemas.openxmlformats.org/presentationml/2006/main">
+  <p:cSld>
+    <p:spTree>
+      <p:nvGrpSpPr>
+        <p:cNvPr id="1" name=""/>
+        <p:cNvGrpSpPr/>
+        <p:nvPr/>
+      </p:nvGrpSpPr>
+      <p:grpSpPr>
+        <a:xfrm>
+          <a:off x="0" y="0"/>
+          <a:ext cx="0" cy="0"/>
+          <a:chOff x="0" y="0"/>
+          <a:chExt cx="0" cy="0"/>
+        </a:xfrm>
+      </p:grpSpPr>
+      <p:sp>
+        <p:nvSpPr>
+          <p:cNvPr id="2" name="Title 1"/>
+          <p:cNvSpPr>
+            <a:spLocks noGrp="1"/>
+          </p:cNvSpPr>
+          <p:nvPr>
+            <p:ph type="title"/>
+          </p:nvPr>
+        </p:nvSpPr>
+        <p:spPr/>
+        <p:txBody>
+          <a:bodyPr/>
+          <a:lstStyle/>
+          <a:p>
+            <a:r>
+              <a:rPr lang="en-US" dirty="0" smtClean="0"/>
               <a:t>Linux</a:t>
             </a:r>
             <a:endParaRPr lang="en-US" dirty="0"/>
@@ -3406,7 +6608,7 @@
 </p:sld>
 </file>
 
-<file path=ppt/slides/slide11.xml><?xml version="1.0" encoding="utf-8"?>
+<file path=ppt/slides/slide23.xml><?xml version="1.0" encoding="utf-8"?>
 <p:sld xmlns:a="http://schemas.openxmlformats.org/drawingml/2006/main" xmlns:r="http://schemas.openxmlformats.org/officeDocument/2006/relationships" xmlns:p="http://schemas.openxmlformats.org/presentationml/2006/main">
   <p:cSld>
     <p:spTree>
@@ -3599,7 +6801,7 @@
 </p:sld>
 </file>
 
-<file path=ppt/slides/slide12.xml><?xml version="1.0" encoding="utf-8"?>
+<file path=ppt/slides/slide24.xml><?xml version="1.0" encoding="utf-8"?>
 <p:sld xmlns:a="http://schemas.openxmlformats.org/drawingml/2006/main" xmlns:r="http://schemas.openxmlformats.org/officeDocument/2006/relationships" xmlns:p="http://schemas.openxmlformats.org/presentationml/2006/main">
   <p:cSld>
     <p:spTree>
@@ -3718,7 +6920,7 @@
 </p:sld>
 </file>
 
-<file path=ppt/slides/slide13.xml><?xml version="1.0" encoding="utf-8"?>
+<file path=ppt/slides/slide25.xml><?xml version="1.0" encoding="utf-8"?>
 <p:sld xmlns:a="http://schemas.openxmlformats.org/drawingml/2006/main" xmlns:r="http://schemas.openxmlformats.org/officeDocument/2006/relationships" xmlns:p="http://schemas.openxmlformats.org/presentationml/2006/main">
   <p:cSld>
     <p:spTree>
@@ -3805,13 +7007,8 @@
             <a:pPr lvl="1"/>
             <a:r>
               <a:rPr lang="en-US" dirty="0" smtClean="0"/>
-              <a:t>Not promoting this as the only or </a:t>
-            </a:r>
-            <a:r>
-              <a:rPr lang="en-US" dirty="0" smtClean="0"/>
-              <a:t>necessarily best workflow</a:t>
-            </a:r>
-            <a:endParaRPr lang="en-US" dirty="0" smtClean="0"/>
+              <a:t>Not promoting this as the only or necessarily best workflow</a:t>
+            </a:r>
           </a:p>
           <a:p>
             <a:pPr lvl="1"/>
@@ -3882,7 +7079,7 @@
 </p:sld>
 </file>
 
-<file path=ppt/slides/slide14.xml><?xml version="1.0" encoding="utf-8"?>
+<file path=ppt/slides/slide26.xml><?xml version="1.0" encoding="utf-8"?>
 <p:sld xmlns:a="http://schemas.openxmlformats.org/drawingml/2006/main" xmlns:r="http://schemas.openxmlformats.org/officeDocument/2006/relationships" xmlns:p="http://schemas.openxmlformats.org/presentationml/2006/main">
   <p:cSld>
     <p:spTree>
@@ -3981,7 +7178,7 @@
 </p:sld>
 </file>
 
-<file path=ppt/slides/slide15.xml><?xml version="1.0" encoding="utf-8"?>
+<file path=ppt/slides/slide27.xml><?xml version="1.0" encoding="utf-8"?>
 <p:sld xmlns:a="http://schemas.openxmlformats.org/drawingml/2006/main" xmlns:r="http://schemas.openxmlformats.org/officeDocument/2006/relationships" xmlns:p="http://schemas.openxmlformats.org/presentationml/2006/main">
   <p:cSld>
     <p:spTree>
@@ -4077,7 +7274,6 @@
               <a:rPr lang="en-US" dirty="0" smtClean="0"/>
               <a:t>Chapter 1</a:t>
             </a:r>
-            <a:endParaRPr lang="en-US" dirty="0" smtClean="0"/>
           </a:p>
           <a:p>
             <a:r>
@@ -4132,127 +7328,6 @@
     <p:extLst>
       <p:ext uri="{BB962C8B-B14F-4D97-AF65-F5344CB8AC3E}">
         <p14:creationId xmlns:p14="http://schemas.microsoft.com/office/powerpoint/2010/main" val="1032613"/>
-      </p:ext>
-    </p:extLst>
-  </p:cSld>
-  <p:clrMapOvr>
-    <a:masterClrMapping/>
-  </p:clrMapOvr>
-</p:sld>
-</file>
-
-<file path=ppt/slides/slide2.xml><?xml version="1.0" encoding="utf-8"?>
-<p:sld xmlns:a="http://schemas.openxmlformats.org/drawingml/2006/main" xmlns:r="http://schemas.openxmlformats.org/officeDocument/2006/relationships" xmlns:p="http://schemas.openxmlformats.org/presentationml/2006/main">
-  <p:cSld>
-    <p:spTree>
-      <p:nvGrpSpPr>
-        <p:cNvPr id="1" name=""/>
-        <p:cNvGrpSpPr/>
-        <p:nvPr/>
-      </p:nvGrpSpPr>
-      <p:grpSpPr>
-        <a:xfrm>
-          <a:off x="0" y="0"/>
-          <a:ext cx="0" cy="0"/>
-          <a:chOff x="0" y="0"/>
-          <a:chExt cx="0" cy="0"/>
-        </a:xfrm>
-      </p:grpSpPr>
-      <p:sp>
-        <p:nvSpPr>
-          <p:cNvPr id="2" name="Title 1"/>
-          <p:cNvSpPr>
-            <a:spLocks noGrp="1"/>
-          </p:cNvSpPr>
-          <p:nvPr>
-            <p:ph type="title"/>
-          </p:nvPr>
-        </p:nvSpPr>
-        <p:spPr/>
-        <p:txBody>
-          <a:bodyPr/>
-          <a:lstStyle/>
-          <a:p>
-            <a:r>
-              <a:rPr lang="en-US" smtClean="0"/>
-              <a:t>Agenda</a:t>
-            </a:r>
-            <a:endParaRPr lang="en-US" dirty="0"/>
-          </a:p>
-        </p:txBody>
-      </p:sp>
-      <p:sp>
-        <p:nvSpPr>
-          <p:cNvPr id="3" name="Content Placeholder 2"/>
-          <p:cNvSpPr>
-            <a:spLocks noGrp="1"/>
-          </p:cNvSpPr>
-          <p:nvPr>
-            <p:ph idx="1"/>
-          </p:nvPr>
-        </p:nvSpPr>
-        <p:spPr/>
-        <p:txBody>
-          <a:bodyPr/>
-          <a:lstStyle/>
-          <a:p>
-            <a:r>
-              <a:rPr lang="en-US" dirty="0" smtClean="0"/>
-              <a:t>Review readings</a:t>
-            </a:r>
-          </a:p>
-          <a:p>
-            <a:r>
-              <a:rPr lang="en-US" dirty="0" smtClean="0"/>
-              <a:t>Linux fundamentals</a:t>
-            </a:r>
-            <a:endParaRPr lang="en-US" dirty="0"/>
-          </a:p>
-          <a:p>
-            <a:r>
-              <a:rPr lang="en-US" dirty="0" smtClean="0"/>
-              <a:t>Package management</a:t>
-            </a:r>
-          </a:p>
-          <a:p>
-            <a:r>
-              <a:rPr lang="en-US" dirty="0" smtClean="0"/>
-              <a:t>Shell scripting</a:t>
-            </a:r>
-          </a:p>
-          <a:p>
-            <a:endParaRPr lang="en-US" dirty="0" smtClean="0"/>
-          </a:p>
-        </p:txBody>
-      </p:sp>
-      <p:pic>
-        <p:nvPicPr>
-          <p:cNvPr id="4" name="Picture 3"/>
-          <p:cNvPicPr>
-            <a:picLocks noChangeAspect="1"/>
-          </p:cNvPicPr>
-          <p:nvPr/>
-        </p:nvPicPr>
-        <p:blipFill>
-          <a:blip r:embed="rId2"/>
-          <a:stretch>
-            <a:fillRect/>
-          </a:stretch>
-        </p:blipFill>
-        <p:spPr>
-          <a:xfrm>
-            <a:off x="5791282" y="1600200"/>
-            <a:ext cx="2641600" cy="3073400"/>
-          </a:xfrm>
-          <a:prstGeom prst="rect">
-            <a:avLst/>
-          </a:prstGeom>
-        </p:spPr>
-      </p:pic>
-    </p:spTree>
-    <p:extLst>
-      <p:ext uri="{BB962C8B-B14F-4D97-AF65-F5344CB8AC3E}">
-        <p14:creationId xmlns:p14="http://schemas.microsoft.com/office/powerpoint/2010/main" val="3024628326"/>
       </p:ext>
     </p:extLst>
   </p:cSld>
@@ -4513,11 +7588,7 @@
             <a:pPr lvl="2"/>
             <a:r>
               <a:rPr lang="en-US" dirty="0" smtClean="0"/>
-              <a:t>Difficult/frequent = automate (but maybe acquire</a:t>
-            </a:r>
-            <a:r>
-              <a:rPr lang="en-US" dirty="0" smtClean="0"/>
-              <a:t>)</a:t>
+              <a:t>Difficult/frequent = automate (but maybe acquire)</a:t>
             </a:r>
           </a:p>
           <a:p>
@@ -4680,11 +7751,7 @@
             <a:pPr lvl="2"/>
             <a:r>
               <a:rPr lang="en-US" dirty="0" smtClean="0"/>
-              <a:t>Try to strike a balance between automation and future growth in </a:t>
-            </a:r>
-            <a:r>
-              <a:rPr lang="en-US" dirty="0" smtClean="0"/>
-              <a:t>learning</a:t>
+              <a:t>Try to strike a balance between automation and future growth in learning</a:t>
             </a:r>
           </a:p>
           <a:p>
@@ -4998,11 +8065,7 @@
             <a:pPr lvl="1"/>
             <a:r>
               <a:rPr lang="en-US" dirty="0" smtClean="0"/>
-              <a:t>Start small and work incrementally, don’t try to automate everything at </a:t>
-            </a:r>
-            <a:r>
-              <a:rPr lang="en-US" dirty="0" smtClean="0"/>
-              <a:t>once</a:t>
+              <a:t>Start small and work incrementally, don’t try to automate everything at once</a:t>
             </a:r>
           </a:p>
           <a:p>
@@ -5077,14 +8140,12 @@
         </p:nvSpPr>
         <p:spPr/>
         <p:txBody>
-          <a:bodyPr>
-            <a:normAutofit/>
-          </a:bodyPr>
-          <a:lstStyle/>
-          <a:p>
-            <a:r>
-              <a:rPr lang="en-US" dirty="0" smtClean="0"/>
-              <a:t>Linux</a:t>
+          <a:bodyPr/>
+          <a:lstStyle/>
+          <a:p>
+            <a:r>
+              <a:rPr lang="en-US" dirty="0" smtClean="0"/>
+              <a:t>Shell Scripting</a:t>
             </a:r>
             <a:endParaRPr lang="en-US" dirty="0"/>
           </a:p>
@@ -5100,53 +8161,42 @@
             <p:ph idx="1"/>
           </p:nvPr>
         </p:nvSpPr>
-        <p:spPr>
-          <a:xfrm>
-            <a:off x="457200" y="1600200"/>
-            <a:ext cx="8229600" cy="4895374"/>
-          </a:xfrm>
-        </p:spPr>
-        <p:txBody>
-          <a:bodyPr>
-            <a:normAutofit fontScale="92500" lnSpcReduction="10000"/>
-          </a:bodyPr>
-          <a:lstStyle/>
-          <a:p>
-            <a:r>
-              <a:rPr lang="en-US" dirty="0" smtClean="0"/>
-              <a:t>History</a:t>
-            </a:r>
-          </a:p>
-          <a:p>
-            <a:pPr lvl="1"/>
-            <a:r>
-              <a:rPr lang="en-US" dirty="0" smtClean="0"/>
-              <a:t>Started by Linus Torvalds in 1991</a:t>
-            </a:r>
-          </a:p>
-          <a:p>
-            <a:pPr lvl="1"/>
-            <a:r>
-              <a:rPr lang="en-US" dirty="0" smtClean="0"/>
-              <a:t>Inspired by Unix, developed at AT&amp;T in 1970s</a:t>
-            </a:r>
-          </a:p>
-          <a:p>
-            <a:pPr lvl="1"/>
-            <a:r>
-              <a:rPr lang="en-US" dirty="0" smtClean="0"/>
-              <a:t>Linux is not Unix, but uses same concepts</a:t>
-            </a:r>
-          </a:p>
-          <a:p>
-            <a:pPr lvl="1"/>
-            <a:r>
-              <a:rPr lang="en-US" dirty="0" smtClean="0"/>
-              <a:t>Open Source Software (General Public License</a:t>
-            </a:r>
-            <a:r>
-              <a:rPr lang="en-US" dirty="0" smtClean="0"/>
-              <a:t>)</a:t>
+        <p:spPr/>
+        <p:txBody>
+          <a:bodyPr/>
+          <a:lstStyle/>
+          <a:p>
+            <a:r>
+              <a:rPr lang="en-US" dirty="0" smtClean="0"/>
+              <a:t>Shell scripts are traditionally the most common tool used for infrastructure automation.</a:t>
+            </a:r>
+          </a:p>
+          <a:p>
+            <a:pPr lvl="1"/>
+            <a:r>
+              <a:rPr lang="en-US" dirty="0" smtClean="0"/>
+              <a:t>Simple and quick to create</a:t>
+            </a:r>
+          </a:p>
+          <a:p>
+            <a:pPr lvl="1"/>
+            <a:r>
+              <a:rPr lang="en-US" dirty="0" smtClean="0"/>
+              <a:t>Interpreted and executed by systems immediately</a:t>
+            </a:r>
+          </a:p>
+          <a:p>
+            <a:pPr lvl="1"/>
+            <a:r>
+              <a:rPr lang="en-US" dirty="0" smtClean="0"/>
+              <a:t>Batch of commands grouped together in a file and executed from top to bottom</a:t>
+            </a:r>
+          </a:p>
+          <a:p>
+            <a:pPr lvl="1"/>
+            <a:r>
+              <a:rPr lang="en-US" dirty="0" smtClean="0"/>
+              <a:t>Supported by wide variety of operating systems including Unix, Linux, Windows</a:t>
             </a:r>
           </a:p>
           <a:p>
@@ -5154,55 +8204,15 @@
             <a:endParaRPr lang="en-US" dirty="0" smtClean="0"/>
           </a:p>
           <a:p>
-            <a:r>
-              <a:rPr lang="en-US" dirty="0" smtClean="0"/>
-              <a:t>Runs on cells phones to largest </a:t>
-            </a:r>
-            <a:r>
-              <a:rPr lang="en-US" dirty="0" smtClean="0"/>
-              <a:t>supercomputers</a:t>
-            </a:r>
-          </a:p>
-          <a:p>
-            <a:endParaRPr lang="en-US" dirty="0" smtClean="0"/>
-          </a:p>
-          <a:p>
-            <a:r>
-              <a:rPr lang="en-US" dirty="0" smtClean="0"/>
-              <a:t>Perfect for supporting service-based application architecture in the cloud</a:t>
-            </a:r>
+            <a:pPr lvl="1"/>
             <a:endParaRPr lang="en-US" dirty="0"/>
           </a:p>
         </p:txBody>
       </p:sp>
-      <p:pic>
-        <p:nvPicPr>
-          <p:cNvPr id="4" name="Picture 3"/>
-          <p:cNvPicPr>
-            <a:picLocks noChangeAspect="1"/>
-          </p:cNvPicPr>
-          <p:nvPr/>
-        </p:nvPicPr>
-        <p:blipFill>
-          <a:blip r:embed="rId2"/>
-          <a:stretch>
-            <a:fillRect/>
-          </a:stretch>
-        </p:blipFill>
-        <p:spPr>
-          <a:xfrm>
-            <a:off x="6930759" y="432268"/>
-            <a:ext cx="1449139" cy="1686017"/>
-          </a:xfrm>
-          <a:prstGeom prst="rect">
-            <a:avLst/>
-          </a:prstGeom>
-        </p:spPr>
-      </p:pic>
     </p:spTree>
     <p:extLst>
       <p:ext uri="{BB962C8B-B14F-4D97-AF65-F5344CB8AC3E}">
-        <p14:creationId xmlns:p14="http://schemas.microsoft.com/office/powerpoint/2010/main" val="3312454313"/>
+        <p14:creationId xmlns:p14="http://schemas.microsoft.com/office/powerpoint/2010/main" val="542701460"/>
       </p:ext>
     </p:extLst>
   </p:cSld>
@@ -5246,7 +8256,7 @@
           <a:p>
             <a:r>
               <a:rPr lang="en-US" dirty="0" smtClean="0"/>
-              <a:t>Linux</a:t>
+              <a:t>Shell Scripting</a:t>
             </a:r>
             <a:endParaRPr lang="en-US" dirty="0"/>
           </a:p>
@@ -5262,34 +8272,35 @@
             <p:ph idx="1"/>
           </p:nvPr>
         </p:nvSpPr>
-        <p:spPr/>
+        <p:spPr>
+          <a:xfrm>
+            <a:off x="457200" y="1600200"/>
+            <a:ext cx="8229600" cy="4813663"/>
+          </a:xfrm>
+        </p:spPr>
         <p:txBody>
           <a:bodyPr>
-            <a:normAutofit fontScale="92500"/>
+            <a:normAutofit fontScale="92500" lnSpcReduction="10000"/>
           </a:bodyPr>
           <a:lstStyle/>
           <a:p>
             <a:r>
               <a:rPr lang="en-US" dirty="0" smtClean="0"/>
-              <a:t>Why Linux? </a:t>
-            </a:r>
-          </a:p>
-          <a:p>
-            <a:pPr lvl="1"/>
-            <a:r>
-              <a:rPr lang="en-US" dirty="0"/>
-              <a:t>C</a:t>
-            </a:r>
-            <a:r>
-              <a:rPr lang="en-US" dirty="0" smtClean="0"/>
-              <a:t>ommon platform for modern distributed applications</a:t>
-            </a:r>
-          </a:p>
-          <a:p>
-            <a:pPr lvl="1"/>
-            <a:r>
-              <a:rPr lang="en-US" dirty="0" smtClean="0"/>
-              <a:t>Automation starts at the command line, not the GUI</a:t>
+              <a:t>We will focus on Linux shell scripts in this course using the BASH shell.</a:t>
+            </a:r>
+          </a:p>
+          <a:p>
+            <a:pPr lvl="1"/>
+            <a:r>
+              <a:rPr lang="en-US" dirty="0" smtClean="0"/>
+              <a:t>Free replacement for the Bourne shell </a:t>
+            </a:r>
+          </a:p>
+          <a:p>
+            <a:pPr lvl="1"/>
+            <a:r>
+              <a:rPr lang="en-US" dirty="0" smtClean="0"/>
+              <a:t>Released in 1989 and used as default shell for most Linux distributions</a:t>
             </a:r>
           </a:p>
           <a:p>
@@ -5299,32 +8310,30 @@
           <a:p>
             <a:r>
               <a:rPr lang="en-US" dirty="0" smtClean="0"/>
-              <a:t>Caveat: It’s not possible to learn Linux in a few hours. </a:t>
-            </a:r>
-          </a:p>
-          <a:p>
-            <a:pPr lvl="1"/>
-            <a:r>
-              <a:rPr lang="en-US" dirty="0" smtClean="0"/>
-              <a:t>Plan to invest meaningful time outside of class if you aren’t already familiar with it. </a:t>
-            </a:r>
-          </a:p>
-          <a:p>
-            <a:endParaRPr lang="en-US" dirty="0" smtClean="0"/>
-          </a:p>
-          <a:p>
-            <a:endParaRPr lang="en-US" dirty="0" smtClean="0"/>
-          </a:p>
-          <a:p>
-            <a:pPr lvl="1"/>
-            <a:endParaRPr lang="en-US" dirty="0" smtClean="0"/>
+              <a:t>What is a shell?</a:t>
+            </a:r>
+          </a:p>
+          <a:p>
+            <a:pPr lvl="1"/>
+            <a:r>
+              <a:rPr lang="en-US" dirty="0" smtClean="0"/>
+              <a:t>An interactive command line processer that runs in a text window.</a:t>
+            </a:r>
+          </a:p>
+          <a:p>
+            <a:pPr lvl="1"/>
+            <a:r>
+              <a:rPr lang="en-US" dirty="0" smtClean="0"/>
+              <a:t>User can type in commands manually or the shell can read commands from a file (shell script).</a:t>
+            </a:r>
+            <a:endParaRPr lang="en-US" dirty="0"/>
           </a:p>
         </p:txBody>
       </p:sp>
     </p:spTree>
     <p:extLst>
       <p:ext uri="{BB962C8B-B14F-4D97-AF65-F5344CB8AC3E}">
-        <p14:creationId xmlns:p14="http://schemas.microsoft.com/office/powerpoint/2010/main" val="3727470488"/>
+        <p14:creationId xmlns:p14="http://schemas.microsoft.com/office/powerpoint/2010/main" val="1765998018"/>
       </p:ext>
     </p:extLst>
   </p:cSld>

</xml_diff>

<commit_message>
update lecture 3 and add salary report
</commit_message>
<xml_diff>
--- a/lectures/infrastructure-week-2.pptx
+++ b/lectures/infrastructure-week-2.pptx
@@ -8,9 +8,9 @@
     <p:sldId id="257" r:id="rId2"/>
     <p:sldId id="258" r:id="rId3"/>
     <p:sldId id="260" r:id="rId4"/>
-    <p:sldId id="261" r:id="rId5"/>
-    <p:sldId id="262" r:id="rId6"/>
-    <p:sldId id="263" r:id="rId7"/>
+    <p:sldId id="263" r:id="rId5"/>
+    <p:sldId id="261" r:id="rId6"/>
+    <p:sldId id="262" r:id="rId7"/>
     <p:sldId id="264" r:id="rId8"/>
     <p:sldId id="274" r:id="rId9"/>
     <p:sldId id="275" r:id="rId10"/>
@@ -357,7 +357,7 @@
           <a:p>
             <a:fld id="{5B60E164-4364-3441-BA83-2CF3942ACF8D}" type="datetimeFigureOut">
               <a:rPr lang="en-US" smtClean="0"/>
-              <a:t>9/18/16</a:t>
+              <a:t>9/19/16</a:t>
             </a:fld>
             <a:endParaRPr lang="en-US"/>
           </a:p>
@@ -527,7 +527,7 @@
           <a:p>
             <a:fld id="{5B60E164-4364-3441-BA83-2CF3942ACF8D}" type="datetimeFigureOut">
               <a:rPr lang="en-US" smtClean="0"/>
-              <a:t>9/18/16</a:t>
+              <a:t>9/19/16</a:t>
             </a:fld>
             <a:endParaRPr lang="en-US"/>
           </a:p>
@@ -707,7 +707,7 @@
           <a:p>
             <a:fld id="{5B60E164-4364-3441-BA83-2CF3942ACF8D}" type="datetimeFigureOut">
               <a:rPr lang="en-US" smtClean="0"/>
-              <a:t>9/18/16</a:t>
+              <a:t>9/19/16</a:t>
             </a:fld>
             <a:endParaRPr lang="en-US"/>
           </a:p>
@@ -877,7 +877,7 @@
           <a:p>
             <a:fld id="{5B60E164-4364-3441-BA83-2CF3942ACF8D}" type="datetimeFigureOut">
               <a:rPr lang="en-US" smtClean="0"/>
-              <a:t>9/18/16</a:t>
+              <a:t>9/19/16</a:t>
             </a:fld>
             <a:endParaRPr lang="en-US"/>
           </a:p>
@@ -1123,7 +1123,7 @@
           <a:p>
             <a:fld id="{5B60E164-4364-3441-BA83-2CF3942ACF8D}" type="datetimeFigureOut">
               <a:rPr lang="en-US" smtClean="0"/>
-              <a:t>9/18/16</a:t>
+              <a:t>9/19/16</a:t>
             </a:fld>
             <a:endParaRPr lang="en-US"/>
           </a:p>
@@ -1411,7 +1411,7 @@
           <a:p>
             <a:fld id="{5B60E164-4364-3441-BA83-2CF3942ACF8D}" type="datetimeFigureOut">
               <a:rPr lang="en-US" smtClean="0"/>
-              <a:t>9/18/16</a:t>
+              <a:t>9/19/16</a:t>
             </a:fld>
             <a:endParaRPr lang="en-US"/>
           </a:p>
@@ -1833,7 +1833,7 @@
           <a:p>
             <a:fld id="{5B60E164-4364-3441-BA83-2CF3942ACF8D}" type="datetimeFigureOut">
               <a:rPr lang="en-US" smtClean="0"/>
-              <a:t>9/18/16</a:t>
+              <a:t>9/19/16</a:t>
             </a:fld>
             <a:endParaRPr lang="en-US"/>
           </a:p>
@@ -1951,7 +1951,7 @@
           <a:p>
             <a:fld id="{5B60E164-4364-3441-BA83-2CF3942ACF8D}" type="datetimeFigureOut">
               <a:rPr lang="en-US" smtClean="0"/>
-              <a:t>9/18/16</a:t>
+              <a:t>9/19/16</a:t>
             </a:fld>
             <a:endParaRPr lang="en-US"/>
           </a:p>
@@ -2046,7 +2046,7 @@
           <a:p>
             <a:fld id="{5B60E164-4364-3441-BA83-2CF3942ACF8D}" type="datetimeFigureOut">
               <a:rPr lang="en-US" smtClean="0"/>
-              <a:t>9/18/16</a:t>
+              <a:t>9/19/16</a:t>
             </a:fld>
             <a:endParaRPr lang="en-US"/>
           </a:p>
@@ -2323,7 +2323,7 @@
           <a:p>
             <a:fld id="{5B60E164-4364-3441-BA83-2CF3942ACF8D}" type="datetimeFigureOut">
               <a:rPr lang="en-US" smtClean="0"/>
-              <a:t>9/18/16</a:t>
+              <a:t>9/19/16</a:t>
             </a:fld>
             <a:endParaRPr lang="en-US"/>
           </a:p>
@@ -2576,7 +2576,7 @@
           <a:p>
             <a:fld id="{5B60E164-4364-3441-BA83-2CF3942ACF8D}" type="datetimeFigureOut">
               <a:rPr lang="en-US" smtClean="0"/>
-              <a:t>9/18/16</a:t>
+              <a:t>9/19/16</a:t>
             </a:fld>
             <a:endParaRPr lang="en-US"/>
           </a:p>
@@ -2789,7 +2789,7 @@
           <a:p>
             <a:fld id="{5B60E164-4364-3441-BA83-2CF3942ACF8D}" type="datetimeFigureOut">
               <a:rPr lang="en-US" smtClean="0"/>
-              <a:t>9/18/16</a:t>
+              <a:t>9/19/16</a:t>
             </a:fld>
             <a:endParaRPr lang="en-US"/>
           </a:p>
@@ -3312,6 +3312,13 @@
   <p:clrMapOvr>
     <a:masterClrMapping/>
   </p:clrMapOvr>
+  <p:timing>
+    <p:tnLst>
+      <p:par>
+        <p:cTn id="1" dur="indefinite" restart="never" nodeType="tmRoot"/>
+      </p:par>
+    </p:tnLst>
+  </p:timing>
 </p:sld>
 </file>
 
@@ -3536,6 +3543,13 @@
   <p:clrMapOvr>
     <a:masterClrMapping/>
   </p:clrMapOvr>
+  <p:timing>
+    <p:tnLst>
+      <p:par>
+        <p:cTn id="1" dur="indefinite" restart="never" nodeType="tmRoot"/>
+      </p:par>
+    </p:tnLst>
+  </p:timing>
 </p:sld>
 </file>
 
@@ -3740,6 +3754,13 @@
   <p:clrMapOvr>
     <a:masterClrMapping/>
   </p:clrMapOvr>
+  <p:timing>
+    <p:tnLst>
+      <p:par>
+        <p:cTn id="1" dur="indefinite" restart="never" nodeType="tmRoot"/>
+      </p:par>
+    </p:tnLst>
+  </p:timing>
 </p:sld>
 </file>
 
@@ -3971,6 +3992,13 @@
   <p:clrMapOvr>
     <a:masterClrMapping/>
   </p:clrMapOvr>
+  <p:timing>
+    <p:tnLst>
+      <p:par>
+        <p:cTn id="1" dur="indefinite" restart="never" nodeType="tmRoot"/>
+      </p:par>
+    </p:tnLst>
+  </p:timing>
 </p:sld>
 </file>
 
@@ -4158,6 +4186,13 @@
   <p:clrMapOvr>
     <a:masterClrMapping/>
   </p:clrMapOvr>
+  <p:timing>
+    <p:tnLst>
+      <p:par>
+        <p:cTn id="1" dur="indefinite" restart="never" nodeType="tmRoot"/>
+      </p:par>
+    </p:tnLst>
+  </p:timing>
 </p:sld>
 </file>
 
@@ -4605,6 +4640,13 @@
   <p:clrMapOvr>
     <a:masterClrMapping/>
   </p:clrMapOvr>
+  <p:timing>
+    <p:tnLst>
+      <p:par>
+        <p:cTn id="1" dur="indefinite" restart="never" nodeType="tmRoot"/>
+      </p:par>
+    </p:tnLst>
+  </p:timing>
 </p:sld>
 </file>
 
@@ -4898,6 +4940,13 @@
   <p:clrMapOvr>
     <a:masterClrMapping/>
   </p:clrMapOvr>
+  <p:timing>
+    <p:tnLst>
+      <p:par>
+        <p:cTn id="1" dur="indefinite" restart="never" nodeType="tmRoot"/>
+      </p:par>
+    </p:tnLst>
+  </p:timing>
 </p:sld>
 </file>
 
@@ -5275,6 +5324,13 @@
   <p:clrMapOvr>
     <a:masterClrMapping/>
   </p:clrMapOvr>
+  <p:timing>
+    <p:tnLst>
+      <p:par>
+        <p:cTn id="1" dur="indefinite" restart="never" nodeType="tmRoot"/>
+      </p:par>
+    </p:tnLst>
+  </p:timing>
 </p:sld>
 </file>
 
@@ -5528,6 +5584,13 @@
   <p:clrMapOvr>
     <a:masterClrMapping/>
   </p:clrMapOvr>
+  <p:timing>
+    <p:tnLst>
+      <p:par>
+        <p:cTn id="1" dur="indefinite" restart="never" nodeType="tmRoot"/>
+      </p:par>
+    </p:tnLst>
+  </p:timing>
 </p:sld>
 </file>
 
@@ -5865,6 +5928,13 @@
   <p:clrMapOvr>
     <a:masterClrMapping/>
   </p:clrMapOvr>
+  <p:timing>
+    <p:tnLst>
+      <p:par>
+        <p:cTn id="1" dur="indefinite" restart="never" nodeType="tmRoot"/>
+      </p:par>
+    </p:tnLst>
+  </p:timing>
 </p:sld>
 </file>
 
@@ -6018,7 +6088,39 @@
                 <a:ea typeface="Consolas" charset="0"/>
                 <a:cs typeface="Consolas" charset="0"/>
               </a:rPr>
-              <a:t>cho $(var1-$var2}		# output is 1</a:t>
+              <a:t>cho </a:t>
+            </a:r>
+            <a:r>
+              <a:rPr lang="en-US" smtClean="0">
+                <a:latin typeface="Consolas" charset="0"/>
+                <a:ea typeface="Consolas" charset="0"/>
+                <a:cs typeface="Consolas" charset="0"/>
+              </a:rPr>
+              <a:t>${var2-</a:t>
+            </a:r>
+            <a:r>
+              <a:rPr lang="en-US" smtClean="0">
+                <a:latin typeface="Consolas" charset="0"/>
+                <a:ea typeface="Consolas" charset="0"/>
+                <a:cs typeface="Consolas" charset="0"/>
+              </a:rPr>
+              <a:t>$</a:t>
+            </a:r>
+            <a:r>
+              <a:rPr lang="en-US" smtClean="0">
+                <a:latin typeface="Consolas" charset="0"/>
+                <a:ea typeface="Consolas" charset="0"/>
+                <a:cs typeface="Consolas" charset="0"/>
+              </a:rPr>
+              <a:t>var1}</a:t>
+            </a:r>
+            <a:r>
+              <a:rPr lang="en-US" dirty="0" smtClean="0">
+                <a:latin typeface="Consolas" charset="0"/>
+                <a:ea typeface="Consolas" charset="0"/>
+                <a:cs typeface="Consolas" charset="0"/>
+              </a:rPr>
+              <a:t>		# output is 1</a:t>
             </a:r>
           </a:p>
           <a:p>
@@ -6087,6 +6189,13 @@
   <p:clrMapOvr>
     <a:masterClrMapping/>
   </p:clrMapOvr>
+  <p:timing>
+    <p:tnLst>
+      <p:par>
+        <p:cTn id="1" dur="indefinite" restart="never" nodeType="tmRoot"/>
+      </p:par>
+    </p:tnLst>
+  </p:timing>
 </p:sld>
 </file>
 
@@ -6208,6 +6317,13 @@
   <p:clrMapOvr>
     <a:masterClrMapping/>
   </p:clrMapOvr>
+  <p:timing>
+    <p:tnLst>
+      <p:par>
+        <p:cTn id="1" dur="indefinite" restart="never" nodeType="tmRoot"/>
+      </p:par>
+    </p:tnLst>
+  </p:timing>
 </p:sld>
 </file>
 
@@ -6364,6 +6480,13 @@
   <p:clrMapOvr>
     <a:masterClrMapping/>
   </p:clrMapOvr>
+  <p:timing>
+    <p:tnLst>
+      <p:par>
+        <p:cTn id="1" dur="indefinite" restart="never" nodeType="tmRoot"/>
+      </p:par>
+    </p:tnLst>
+  </p:timing>
 </p:sld>
 </file>
 
@@ -6530,6 +6653,13 @@
   <p:clrMapOvr>
     <a:masterClrMapping/>
   </p:clrMapOvr>
+  <p:timing>
+    <p:tnLst>
+      <p:par>
+        <p:cTn id="1" dur="indefinite" restart="never" nodeType="tmRoot"/>
+      </p:par>
+    </p:tnLst>
+  </p:timing>
 </p:sld>
 </file>
 
@@ -6726,11 +6856,7 @@
             <a:pPr lvl="1"/>
             <a:r>
               <a:rPr lang="en-US" dirty="0" smtClean="0"/>
-              <a:t>Rolling release maintained in an AWS </a:t>
-            </a:r>
-            <a:r>
-              <a:rPr lang="en-US" dirty="0" smtClean="0"/>
-              <a:t>AMI</a:t>
+              <a:t>Rolling release maintained in an AWS AMI</a:t>
             </a:r>
           </a:p>
           <a:p>
@@ -6741,11 +6867,7 @@
             <a:pPr lvl="1"/>
             <a:r>
               <a:rPr lang="en-US" dirty="0" smtClean="0"/>
-              <a:t>Designed for the AWS </a:t>
-            </a:r>
-            <a:r>
-              <a:rPr lang="en-US" dirty="0" smtClean="0"/>
-              <a:t>ecosystem</a:t>
+              <a:t>Designed for the AWS ecosystem</a:t>
             </a:r>
           </a:p>
           <a:p>
@@ -6756,11 +6878,7 @@
             <a:pPr lvl="1"/>
             <a:r>
               <a:rPr lang="en-US" dirty="0" smtClean="0"/>
-              <a:t>Based on Red Hat Enterprise Linux/ </a:t>
-            </a:r>
-            <a:r>
-              <a:rPr lang="en-US" dirty="0" smtClean="0"/>
-              <a:t>CentOS</a:t>
+              <a:t>Based on Red Hat Enterprise Linux/ CentOS</a:t>
             </a:r>
           </a:p>
           <a:p>
@@ -6865,11 +6983,7 @@
           <a:p>
             <a:r>
               <a:rPr lang="en-US" dirty="0" smtClean="0"/>
-              <a:t>Linux </a:t>
-            </a:r>
-            <a:r>
-              <a:rPr lang="en-US" dirty="0" smtClean="0"/>
-              <a:t>Hands-on</a:t>
+              <a:t>Linux Hands-on</a:t>
             </a:r>
             <a:endParaRPr lang="en-US" dirty="0"/>
           </a:p>
@@ -6901,11 +7015,7 @@
             <a:pPr lvl="1"/>
             <a:r>
               <a:rPr lang="en-US" dirty="0" smtClean="0"/>
-              <a:t>Amazon Linux EC2 micro instance running in a public </a:t>
-            </a:r>
-            <a:r>
-              <a:rPr lang="en-US" dirty="0" smtClean="0"/>
-              <a:t>subnet</a:t>
+              <a:t>Amazon Linux EC2 micro instance running in a public subnet</a:t>
             </a:r>
           </a:p>
           <a:p>
@@ -6916,11 +7026,7 @@
             <a:pPr lvl="1"/>
             <a:r>
               <a:rPr lang="en-US" dirty="0" smtClean="0"/>
-              <a:t>Public/Private access keys for the </a:t>
-            </a:r>
-            <a:r>
-              <a:rPr lang="en-US" dirty="0" smtClean="0"/>
-              <a:t>instance</a:t>
+              <a:t>Public/Private access keys for the instance</a:t>
             </a:r>
           </a:p>
           <a:p>
@@ -8174,6 +8280,13 @@
   <p:clrMapOvr>
     <a:masterClrMapping/>
   </p:clrMapOvr>
+  <p:timing>
+    <p:tnLst>
+      <p:par>
+        <p:cTn id="1" dur="indefinite" restart="never" nodeType="tmRoot"/>
+      </p:par>
+    </p:tnLst>
+  </p:timing>
 </p:sld>
 </file>
 
@@ -9831,7 +9944,7 @@
           <a:p>
             <a:r>
               <a:rPr lang="en-US" dirty="0" smtClean="0"/>
-              <a:t>Automation</a:t>
+              <a:t>Automation goals</a:t>
             </a:r>
             <a:endParaRPr lang="en-US" dirty="0"/>
           </a:p>
@@ -9854,81 +9967,82 @@
           </a:bodyPr>
           <a:lstStyle/>
           <a:p>
-            <a:r>
-              <a:rPr lang="en-US" dirty="0" smtClean="0"/>
-              <a:t>Automation approaches:</a:t>
-            </a:r>
-          </a:p>
-          <a:p>
-            <a:pPr lvl="1"/>
-            <a:r>
-              <a:rPr lang="en-US" dirty="0" smtClean="0"/>
-              <a:t>Left-Over Principle: automate everything possible</a:t>
-            </a:r>
-          </a:p>
-          <a:p>
-            <a:pPr lvl="2"/>
-            <a:r>
-              <a:rPr lang="en-US" dirty="0" smtClean="0"/>
-              <a:t>Easy/rare = manual </a:t>
-            </a:r>
-          </a:p>
-          <a:p>
-            <a:pPr lvl="2"/>
-            <a:r>
-              <a:rPr lang="en-US" dirty="0" smtClean="0"/>
-              <a:t>Easy/frequent = automate</a:t>
-            </a:r>
-          </a:p>
-          <a:p>
-            <a:pPr lvl="2"/>
-            <a:r>
-              <a:rPr lang="en-US" dirty="0" smtClean="0"/>
-              <a:t>Difficult/rare = manual (document)</a:t>
-            </a:r>
-          </a:p>
-          <a:p>
-            <a:pPr lvl="2"/>
-            <a:r>
-              <a:rPr lang="en-US" dirty="0" smtClean="0"/>
-              <a:t>Difficult/frequent = automate (but maybe acquire)</a:t>
-            </a:r>
-          </a:p>
-          <a:p>
-            <a:pPr lvl="2"/>
+            <a:pPr lvl="1"/>
+            <a:r>
+              <a:rPr lang="en-US" b="1" dirty="0" smtClean="0"/>
+              <a:t>Help scaling</a:t>
+            </a:r>
+            <a:r>
+              <a:rPr lang="en-US" dirty="0" smtClean="0"/>
+              <a:t>: one person performs the work of many</a:t>
+            </a:r>
+          </a:p>
+          <a:p>
+            <a:pPr lvl="1"/>
             <a:endParaRPr lang="en-US" dirty="0" smtClean="0"/>
           </a:p>
           <a:p>
             <a:pPr lvl="1"/>
             <a:r>
-              <a:rPr lang="en-US" dirty="0" smtClean="0"/>
-              <a:t>Compensatory Principle</a:t>
-            </a:r>
-          </a:p>
-          <a:p>
-            <a:pPr lvl="2"/>
-            <a:r>
-              <a:rPr lang="en-US" dirty="0" smtClean="0"/>
-              <a:t>People aren’t infinitely versatile machines</a:t>
-            </a:r>
-          </a:p>
-          <a:p>
-            <a:pPr lvl="2"/>
-            <a:r>
-              <a:rPr lang="en-US" dirty="0" smtClean="0"/>
-              <a:t>Machines do some things better than people and vice-versa</a:t>
-            </a:r>
-          </a:p>
-          <a:p>
-            <a:pPr lvl="2"/>
-            <a:r>
-              <a:rPr lang="en-US" dirty="0" smtClean="0"/>
-              <a:t>Example: machines better at polling remote hosts every 5 minutes for performance metrics</a:t>
-            </a:r>
-          </a:p>
-          <a:p>
-            <a:pPr lvl="1"/>
-            <a:endParaRPr lang="en-US" dirty="0"/>
+              <a:rPr lang="en-US" b="1" dirty="0" smtClean="0"/>
+              <a:t>Improve accuracy/ repeatability</a:t>
+            </a:r>
+            <a:r>
+              <a:rPr lang="en-US" dirty="0" smtClean="0"/>
+              <a:t>: perform task same way every time</a:t>
+            </a:r>
+          </a:p>
+          <a:p>
+            <a:pPr lvl="1"/>
+            <a:endParaRPr lang="en-US" dirty="0" smtClean="0"/>
+          </a:p>
+          <a:p>
+            <a:pPr lvl="1"/>
+            <a:r>
+              <a:rPr lang="en-US" b="1" dirty="0" smtClean="0"/>
+              <a:t>Save time</a:t>
+            </a:r>
+            <a:r>
+              <a:rPr lang="en-US" dirty="0" smtClean="0"/>
+              <a:t>: perform task faster than human</a:t>
+            </a:r>
+          </a:p>
+          <a:p>
+            <a:pPr lvl="1"/>
+            <a:endParaRPr lang="en-US" dirty="0" smtClean="0"/>
+          </a:p>
+          <a:p>
+            <a:pPr lvl="1"/>
+            <a:r>
+              <a:rPr lang="en-US" b="1" dirty="0" smtClean="0"/>
+              <a:t>Make processes safer</a:t>
+            </a:r>
+            <a:r>
+              <a:rPr lang="en-US" dirty="0" smtClean="0"/>
+              <a:t>: eliminate mistakes</a:t>
+            </a:r>
+          </a:p>
+          <a:p>
+            <a:pPr lvl="1"/>
+            <a:endParaRPr lang="en-US" dirty="0" smtClean="0"/>
+          </a:p>
+          <a:p>
+            <a:pPr lvl="1"/>
+            <a:r>
+              <a:rPr lang="en-US" b="1" dirty="0" smtClean="0"/>
+              <a:t>Empower users</a:t>
+            </a:r>
+            <a:r>
+              <a:rPr lang="en-US" dirty="0" smtClean="0"/>
+              <a:t>: let’s less experienced people perform complex tasks</a:t>
+            </a:r>
+          </a:p>
+          <a:p>
+            <a:endParaRPr lang="en-US" dirty="0" smtClean="0"/>
+          </a:p>
+          <a:p>
+            <a:pPr lvl="1"/>
+            <a:endParaRPr lang="en-US" dirty="0" smtClean="0"/>
           </a:p>
         </p:txBody>
       </p:sp>
@@ -9948,8 +10062,8 @@
         </p:blipFill>
         <p:spPr>
           <a:xfrm>
-            <a:off x="6518890" y="439195"/>
-            <a:ext cx="1781399" cy="1451801"/>
+            <a:off x="6963468" y="274638"/>
+            <a:ext cx="1883853" cy="1883853"/>
           </a:xfrm>
           <a:prstGeom prst="rect">
             <a:avLst/>
@@ -9959,13 +10073,20 @@
     </p:spTree>
     <p:extLst>
       <p:ext uri="{BB962C8B-B14F-4D97-AF65-F5344CB8AC3E}">
-        <p14:creationId xmlns:p14="http://schemas.microsoft.com/office/powerpoint/2010/main" val="2262114456"/>
+        <p14:creationId xmlns:p14="http://schemas.microsoft.com/office/powerpoint/2010/main" val="3301385349"/>
       </p:ext>
     </p:extLst>
   </p:cSld>
   <p:clrMapOvr>
     <a:masterClrMapping/>
   </p:clrMapOvr>
+  <p:timing>
+    <p:tnLst>
+      <p:par>
+        <p:cTn id="1" dur="indefinite" restart="never" nodeType="tmRoot"/>
+      </p:par>
+    </p:tnLst>
+  </p:timing>
 </p:sld>
 </file>
 
@@ -11762,94 +11883,132 @@
             <p:ph idx="1"/>
           </p:nvPr>
         </p:nvSpPr>
+        <p:spPr/>
+        <p:txBody>
+          <a:bodyPr>
+            <a:normAutofit fontScale="92500" lnSpcReduction="20000"/>
+          </a:bodyPr>
+          <a:lstStyle/>
+          <a:p>
+            <a:r>
+              <a:rPr lang="en-US" dirty="0" smtClean="0"/>
+              <a:t>Automation approaches:</a:t>
+            </a:r>
+          </a:p>
+          <a:p>
+            <a:pPr lvl="1"/>
+            <a:r>
+              <a:rPr lang="en-US" dirty="0" smtClean="0"/>
+              <a:t>Left-Over Principle: automate everything possible</a:t>
+            </a:r>
+          </a:p>
+          <a:p>
+            <a:pPr lvl="2"/>
+            <a:r>
+              <a:rPr lang="en-US" dirty="0" smtClean="0"/>
+              <a:t>Easy/rare = manual </a:t>
+            </a:r>
+          </a:p>
+          <a:p>
+            <a:pPr lvl="2"/>
+            <a:r>
+              <a:rPr lang="en-US" dirty="0" smtClean="0"/>
+              <a:t>Easy/frequent = automate</a:t>
+            </a:r>
+          </a:p>
+          <a:p>
+            <a:pPr lvl="2"/>
+            <a:r>
+              <a:rPr lang="en-US" dirty="0" smtClean="0"/>
+              <a:t>Difficult/rare = manual (document)</a:t>
+            </a:r>
+          </a:p>
+          <a:p>
+            <a:pPr lvl="2"/>
+            <a:r>
+              <a:rPr lang="en-US" dirty="0" smtClean="0"/>
+              <a:t>Difficult/frequent = automate (but maybe acquire)</a:t>
+            </a:r>
+          </a:p>
+          <a:p>
+            <a:pPr lvl="2"/>
+            <a:endParaRPr lang="en-US" dirty="0" smtClean="0"/>
+          </a:p>
+          <a:p>
+            <a:pPr lvl="1"/>
+            <a:r>
+              <a:rPr lang="en-US" dirty="0" smtClean="0"/>
+              <a:t>Compensatory Principle</a:t>
+            </a:r>
+          </a:p>
+          <a:p>
+            <a:pPr lvl="2"/>
+            <a:r>
+              <a:rPr lang="en-US" dirty="0" smtClean="0"/>
+              <a:t>People aren’t infinitely versatile machines</a:t>
+            </a:r>
+          </a:p>
+          <a:p>
+            <a:pPr lvl="2"/>
+            <a:r>
+              <a:rPr lang="en-US" dirty="0" smtClean="0"/>
+              <a:t>Machines do some things better than people and vice-versa</a:t>
+            </a:r>
+          </a:p>
+          <a:p>
+            <a:pPr lvl="2"/>
+            <a:r>
+              <a:rPr lang="en-US" dirty="0" smtClean="0"/>
+              <a:t>Example: machines better at polling remote hosts every 5 minutes for performance metrics</a:t>
+            </a:r>
+          </a:p>
+          <a:p>
+            <a:pPr lvl="1"/>
+            <a:endParaRPr lang="en-US" dirty="0"/>
+          </a:p>
+        </p:txBody>
+      </p:sp>
+      <p:pic>
+        <p:nvPicPr>
+          <p:cNvPr id="4" name="Picture 3"/>
+          <p:cNvPicPr>
+            <a:picLocks noChangeAspect="1"/>
+          </p:cNvPicPr>
+          <p:nvPr/>
+        </p:nvPicPr>
+        <p:blipFill>
+          <a:blip r:embed="rId2"/>
+          <a:stretch>
+            <a:fillRect/>
+          </a:stretch>
+        </p:blipFill>
         <p:spPr>
           <a:xfrm>
-            <a:off x="457200" y="1600200"/>
-            <a:ext cx="8229600" cy="4884136"/>
+            <a:off x="6518890" y="439195"/>
+            <a:ext cx="1781399" cy="1451801"/>
           </a:xfrm>
+          <a:prstGeom prst="rect">
+            <a:avLst/>
+          </a:prstGeom>
         </p:spPr>
-        <p:txBody>
-          <a:bodyPr>
-            <a:normAutofit fontScale="85000" lnSpcReduction="10000"/>
-          </a:bodyPr>
-          <a:lstStyle/>
-          <a:p>
-            <a:r>
-              <a:rPr lang="en-US" dirty="0" smtClean="0"/>
-              <a:t>Automation approaches:</a:t>
-            </a:r>
-          </a:p>
-          <a:p>
-            <a:pPr lvl="1"/>
-            <a:r>
-              <a:rPr lang="en-US" dirty="0" smtClean="0"/>
-              <a:t>Complementarity Principle</a:t>
-            </a:r>
-          </a:p>
-          <a:p>
-            <a:pPr lvl="2"/>
-            <a:r>
-              <a:rPr lang="en-US" dirty="0" smtClean="0"/>
-              <a:t>The more a system is automated, the less people understand how the system works</a:t>
-            </a:r>
-          </a:p>
-          <a:p>
-            <a:pPr lvl="2"/>
-            <a:r>
-              <a:rPr lang="en-US" dirty="0" smtClean="0"/>
-              <a:t>Try to strike a balance between automation and future growth in learning</a:t>
-            </a:r>
-          </a:p>
-          <a:p>
-            <a:pPr lvl="2"/>
-            <a:endParaRPr lang="en-US" dirty="0" smtClean="0"/>
-          </a:p>
-          <a:p>
-            <a:r>
-              <a:rPr lang="en-US" dirty="0" smtClean="0"/>
-              <a:t>Tool building vs. automation</a:t>
-            </a:r>
-          </a:p>
-          <a:p>
-            <a:pPr lvl="1"/>
-            <a:r>
-              <a:rPr lang="en-US" dirty="0" smtClean="0"/>
-              <a:t>Tools improve a manual task so that it can be done better</a:t>
-            </a:r>
-          </a:p>
-          <a:p>
-            <a:pPr lvl="2"/>
-            <a:r>
-              <a:rPr lang="en-US" dirty="0" smtClean="0"/>
-              <a:t>Self-service web interface allowing user to launch a new server</a:t>
-            </a:r>
-          </a:p>
-          <a:p>
-            <a:pPr lvl="1"/>
-            <a:r>
-              <a:rPr lang="en-US" dirty="0" smtClean="0"/>
-              <a:t>Automation eliminates the need to perform a manual task</a:t>
-            </a:r>
-          </a:p>
-          <a:p>
-            <a:pPr lvl="2"/>
-            <a:r>
-              <a:rPr lang="en-US" dirty="0" smtClean="0"/>
-              <a:t>Auto-scaling service that automatically launches a server based on predefined trigger</a:t>
-            </a:r>
-          </a:p>
-        </p:txBody>
-      </p:sp>
+      </p:pic>
     </p:spTree>
     <p:extLst>
       <p:ext uri="{BB962C8B-B14F-4D97-AF65-F5344CB8AC3E}">
-        <p14:creationId xmlns:p14="http://schemas.microsoft.com/office/powerpoint/2010/main" val="3933324911"/>
+        <p14:creationId xmlns:p14="http://schemas.microsoft.com/office/powerpoint/2010/main" val="2262114456"/>
       </p:ext>
     </p:extLst>
   </p:cSld>
   <p:clrMapOvr>
     <a:masterClrMapping/>
   </p:clrMapOvr>
+  <p:timing>
+    <p:tnLst>
+      <p:par>
+        <p:cTn id="1" dur="indefinite" restart="never" nodeType="tmRoot"/>
+      </p:par>
+    </p:tnLst>
+  </p:timing>
 </p:sld>
 </file>
 
@@ -12620,7 +12779,7 @@
           <a:p>
             <a:r>
               <a:rPr lang="en-US" dirty="0" smtClean="0"/>
-              <a:t>Automation goals</a:t>
+              <a:t>Automation</a:t>
             </a:r>
             <a:endParaRPr lang="en-US" dirty="0"/>
           </a:p>
@@ -12636,126 +12795,101 @@
             <p:ph idx="1"/>
           </p:nvPr>
         </p:nvSpPr>
-        <p:spPr/>
-        <p:txBody>
-          <a:bodyPr>
-            <a:normAutofit fontScale="92500" lnSpcReduction="20000"/>
-          </a:bodyPr>
-          <a:lstStyle/>
-          <a:p>
-            <a:pPr lvl="1"/>
-            <a:r>
-              <a:rPr lang="en-US" b="1" dirty="0" smtClean="0"/>
-              <a:t>Help scaling</a:t>
-            </a:r>
-            <a:r>
-              <a:rPr lang="en-US" dirty="0" smtClean="0"/>
-              <a:t>: one person performs the work of many</a:t>
-            </a:r>
-          </a:p>
-          <a:p>
-            <a:pPr lvl="1"/>
-            <a:endParaRPr lang="en-US" dirty="0" smtClean="0"/>
-          </a:p>
-          <a:p>
-            <a:pPr lvl="1"/>
-            <a:r>
-              <a:rPr lang="en-US" b="1" dirty="0" smtClean="0"/>
-              <a:t>Improve accuracy/ repeatability</a:t>
-            </a:r>
-            <a:r>
-              <a:rPr lang="en-US" dirty="0" smtClean="0"/>
-              <a:t>: perform task same way every time</a:t>
-            </a:r>
-          </a:p>
-          <a:p>
-            <a:pPr lvl="1"/>
-            <a:endParaRPr lang="en-US" dirty="0" smtClean="0"/>
-          </a:p>
-          <a:p>
-            <a:pPr lvl="1"/>
-            <a:r>
-              <a:rPr lang="en-US" b="1" dirty="0" smtClean="0"/>
-              <a:t>Save time</a:t>
-            </a:r>
-            <a:r>
-              <a:rPr lang="en-US" dirty="0" smtClean="0"/>
-              <a:t>: perform task faster than human</a:t>
-            </a:r>
-          </a:p>
-          <a:p>
-            <a:pPr lvl="1"/>
-            <a:endParaRPr lang="en-US" dirty="0" smtClean="0"/>
-          </a:p>
-          <a:p>
-            <a:pPr lvl="1"/>
-            <a:r>
-              <a:rPr lang="en-US" b="1" dirty="0" smtClean="0"/>
-              <a:t>Make processes safer</a:t>
-            </a:r>
-            <a:r>
-              <a:rPr lang="en-US" dirty="0" smtClean="0"/>
-              <a:t>: eliminate mistakes</a:t>
-            </a:r>
-          </a:p>
-          <a:p>
-            <a:pPr lvl="1"/>
-            <a:endParaRPr lang="en-US" dirty="0" smtClean="0"/>
-          </a:p>
-          <a:p>
-            <a:pPr lvl="1"/>
-            <a:r>
-              <a:rPr lang="en-US" b="1" dirty="0" smtClean="0"/>
-              <a:t>Empower users</a:t>
-            </a:r>
-            <a:r>
-              <a:rPr lang="en-US" dirty="0" smtClean="0"/>
-              <a:t>: let’s less experienced people perform complex tasks</a:t>
-            </a:r>
-          </a:p>
-          <a:p>
-            <a:endParaRPr lang="en-US" dirty="0" smtClean="0"/>
-          </a:p>
-          <a:p>
-            <a:pPr lvl="1"/>
-            <a:endParaRPr lang="en-US" dirty="0" smtClean="0"/>
-          </a:p>
-        </p:txBody>
-      </p:sp>
-      <p:pic>
-        <p:nvPicPr>
-          <p:cNvPr id="4" name="Picture 3"/>
-          <p:cNvPicPr>
-            <a:picLocks noChangeAspect="1"/>
-          </p:cNvPicPr>
-          <p:nvPr/>
-        </p:nvPicPr>
-        <p:blipFill>
-          <a:blip r:embed="rId2"/>
-          <a:stretch>
-            <a:fillRect/>
-          </a:stretch>
-        </p:blipFill>
         <p:spPr>
           <a:xfrm>
-            <a:off x="6963468" y="274638"/>
-            <a:ext cx="1883853" cy="1883853"/>
+            <a:off x="457200" y="1600200"/>
+            <a:ext cx="8229600" cy="4884136"/>
           </a:xfrm>
-          <a:prstGeom prst="rect">
-            <a:avLst/>
-          </a:prstGeom>
         </p:spPr>
-      </p:pic>
+        <p:txBody>
+          <a:bodyPr>
+            <a:normAutofit fontScale="85000" lnSpcReduction="10000"/>
+          </a:bodyPr>
+          <a:lstStyle/>
+          <a:p>
+            <a:r>
+              <a:rPr lang="en-US" dirty="0" smtClean="0"/>
+              <a:t>Automation approaches:</a:t>
+            </a:r>
+          </a:p>
+          <a:p>
+            <a:pPr lvl="1"/>
+            <a:r>
+              <a:rPr lang="en-US" dirty="0" smtClean="0"/>
+              <a:t>Complementarity Principle</a:t>
+            </a:r>
+          </a:p>
+          <a:p>
+            <a:pPr lvl="2"/>
+            <a:r>
+              <a:rPr lang="en-US" dirty="0" smtClean="0"/>
+              <a:t>The more a system is automated, the less people understand how the system works</a:t>
+            </a:r>
+          </a:p>
+          <a:p>
+            <a:pPr lvl="2"/>
+            <a:r>
+              <a:rPr lang="en-US" dirty="0" smtClean="0"/>
+              <a:t>Try to strike a balance between automation and future growth in learning</a:t>
+            </a:r>
+          </a:p>
+          <a:p>
+            <a:pPr lvl="2"/>
+            <a:endParaRPr lang="en-US" dirty="0" smtClean="0"/>
+          </a:p>
+          <a:p>
+            <a:r>
+              <a:rPr lang="en-US" dirty="0" smtClean="0"/>
+              <a:t>Tool building vs. automation</a:t>
+            </a:r>
+          </a:p>
+          <a:p>
+            <a:pPr lvl="1"/>
+            <a:r>
+              <a:rPr lang="en-US" dirty="0" smtClean="0"/>
+              <a:t>Tools improve a manual task so that it can be done better</a:t>
+            </a:r>
+          </a:p>
+          <a:p>
+            <a:pPr lvl="2"/>
+            <a:r>
+              <a:rPr lang="en-US" dirty="0" smtClean="0"/>
+              <a:t>Self-service web interface allowing user to launch a new server</a:t>
+            </a:r>
+          </a:p>
+          <a:p>
+            <a:pPr lvl="1"/>
+            <a:r>
+              <a:rPr lang="en-US" dirty="0" smtClean="0"/>
+              <a:t>Automation eliminates the need to perform a manual task</a:t>
+            </a:r>
+          </a:p>
+          <a:p>
+            <a:pPr lvl="2"/>
+            <a:r>
+              <a:rPr lang="en-US" dirty="0" smtClean="0"/>
+              <a:t>Auto-scaling service that automatically launches a server based on predefined trigger</a:t>
+            </a:r>
+          </a:p>
+        </p:txBody>
+      </p:sp>
     </p:spTree>
     <p:extLst>
       <p:ext uri="{BB962C8B-B14F-4D97-AF65-F5344CB8AC3E}">
-        <p14:creationId xmlns:p14="http://schemas.microsoft.com/office/powerpoint/2010/main" val="3301385349"/>
+        <p14:creationId xmlns:p14="http://schemas.microsoft.com/office/powerpoint/2010/main" val="3933324911"/>
       </p:ext>
     </p:extLst>
   </p:cSld>
   <p:clrMapOvr>
     <a:masterClrMapping/>
   </p:clrMapOvr>
+  <p:timing>
+    <p:tnLst>
+      <p:par>
+        <p:cTn id="1" dur="indefinite" restart="never" nodeType="tmRoot"/>
+      </p:par>
+    </p:tnLst>
+  </p:timing>
 </p:sld>
 </file>
 
@@ -12887,6 +13021,13 @@
   <p:clrMapOvr>
     <a:masterClrMapping/>
   </p:clrMapOvr>
+  <p:timing>
+    <p:tnLst>
+      <p:par>
+        <p:cTn id="1" dur="indefinite" restart="never" nodeType="tmRoot"/>
+      </p:par>
+    </p:tnLst>
+  </p:timing>
 </p:sld>
 </file>
 
@@ -12954,30 +13095,14 @@
           <a:p>
             <a:r>
               <a:rPr lang="en-US" dirty="0" smtClean="0"/>
-              <a:t>Shell scripts are traditionally </a:t>
-            </a:r>
-            <a:r>
-              <a:rPr lang="en-US" dirty="0" smtClean="0"/>
-              <a:t>a </a:t>
-            </a:r>
-            <a:r>
-              <a:rPr lang="en-US" dirty="0" smtClean="0"/>
-              <a:t>common </a:t>
-            </a:r>
-            <a:r>
-              <a:rPr lang="en-US" dirty="0" smtClean="0"/>
-              <a:t>tool used for infrastructure automation.</a:t>
-            </a:r>
-          </a:p>
-          <a:p>
-            <a:pPr lvl="1"/>
-            <a:r>
-              <a:rPr lang="en-US" dirty="0" smtClean="0"/>
-              <a:t>Simple and quick to </a:t>
-            </a:r>
-            <a:r>
-              <a:rPr lang="en-US" dirty="0" smtClean="0"/>
-              <a:t>create</a:t>
+              <a:t>Shell scripts are traditionally a common tool used for infrastructure automation.</a:t>
+            </a:r>
+          </a:p>
+          <a:p>
+            <a:pPr lvl="1"/>
+            <a:r>
+              <a:rPr lang="en-US" dirty="0" smtClean="0"/>
+              <a:t>Simple and quick to create</a:t>
             </a:r>
           </a:p>
           <a:p>
@@ -12988,11 +13113,7 @@
             <a:pPr lvl="1"/>
             <a:r>
               <a:rPr lang="en-US" dirty="0" smtClean="0"/>
-              <a:t>Interpreted and executed by systems </a:t>
-            </a:r>
-            <a:r>
-              <a:rPr lang="en-US" dirty="0" smtClean="0"/>
-              <a:t>immediately</a:t>
+              <a:t>Interpreted and executed by systems immediately</a:t>
             </a:r>
           </a:p>
           <a:p>
@@ -13003,11 +13124,7 @@
             <a:pPr lvl="1"/>
             <a:r>
               <a:rPr lang="en-US" dirty="0" smtClean="0"/>
-              <a:t>Batch of commands grouped together in a file and executed from top to </a:t>
-            </a:r>
-            <a:r>
-              <a:rPr lang="en-US" dirty="0" smtClean="0"/>
-              <a:t>bottom</a:t>
+              <a:t>Batch of commands grouped together in a file and executed from top to bottom</a:t>
             </a:r>
           </a:p>
           <a:p>
@@ -13041,6 +13158,13 @@
   <p:clrMapOvr>
     <a:masterClrMapping/>
   </p:clrMapOvr>
+  <p:timing>
+    <p:tnLst>
+      <p:par>
+        <p:cTn id="1" dur="indefinite" restart="never" nodeType="tmRoot"/>
+      </p:par>
+    </p:tnLst>
+  </p:timing>
 </p:sld>
 </file>
 
@@ -13162,6 +13286,13 @@
   <p:clrMapOvr>
     <a:masterClrMapping/>
   </p:clrMapOvr>
+  <p:timing>
+    <p:tnLst>
+      <p:par>
+        <p:cTn id="1" dur="indefinite" restart="never" nodeType="tmRoot"/>
+      </p:par>
+    </p:tnLst>
+  </p:timing>
 </p:sld>
 </file>
 

</xml_diff>